<commit_message>
Mejoras en Menus y agregar mas imagenes
</commit_message>
<xml_diff>
--- a/Imagenes/Presentación1.pptx
+++ b/Imagenes/Presentación1.pptx
@@ -6,6 +6,7 @@
   </p:sldMasterIdLst>
   <p:sldIdLst>
     <p:sldId id="256" r:id="rId2"/>
+    <p:sldId id="257" r:id="rId3"/>
   </p:sldIdLst>
   <p:sldSz cx="12192000" cy="6858000"/>
   <p:notesSz cx="6858000" cy="9144000"/>
@@ -104,6 +105,11 @@
       </a:defRPr>
     </a:lvl9pPr>
   </p:defaultTextStyle>
+  <p:extLst>
+    <p:ext uri="{EFAFB233-063F-42B5-8137-9DF3F51BA10A}">
+      <p15:sldGuideLst xmlns:p15="http://schemas.microsoft.com/office/powerpoint/2012/main"/>
+    </p:ext>
+  </p:extLst>
 </p:presentation>
 </file>
 
@@ -3360,7 +3366,7 @@
         </p:nvGrpSpPr>
         <p:grpSpPr>
           <a:xfrm>
-            <a:off x="10059630" y="4074628"/>
+            <a:off x="422063" y="3714625"/>
             <a:ext cx="1327639" cy="1381986"/>
             <a:chOff x="410851" y="465992"/>
             <a:chExt cx="1327639" cy="1381986"/>
@@ -3459,7 +3465,7 @@
         </p:nvGrpSpPr>
         <p:grpSpPr>
           <a:xfrm>
-            <a:off x="553843" y="623669"/>
+            <a:off x="519447" y="252063"/>
             <a:ext cx="1558946" cy="1122318"/>
             <a:chOff x="454373" y="1954990"/>
             <a:chExt cx="1558946" cy="1122318"/>
@@ -3555,7 +3561,7 @@
         </p:nvGrpSpPr>
         <p:grpSpPr>
           <a:xfrm>
-            <a:off x="0" y="2094074"/>
+            <a:off x="-34396" y="1722468"/>
             <a:ext cx="1933175" cy="1806820"/>
             <a:chOff x="80144" y="3184320"/>
             <a:chExt cx="1933175" cy="1806820"/>
@@ -3651,7 +3657,7 @@
         </p:nvGrpSpPr>
         <p:grpSpPr>
           <a:xfrm>
-            <a:off x="467239" y="5009949"/>
+            <a:off x="491319" y="5416432"/>
             <a:ext cx="1258383" cy="1211140"/>
             <a:chOff x="467239" y="5009949"/>
             <a:chExt cx="1258383" cy="1211140"/>
@@ -3735,10 +3741,10 @@
       </p:grpSp>
       <p:grpSp>
         <p:nvGrpSpPr>
-          <p:cNvPr id="44" name="Grupo 43">
-            <a:extLst>
-              <a:ext uri="{FF2B5EF4-FFF2-40B4-BE49-F238E27FC236}">
-                <a16:creationId xmlns:a16="http://schemas.microsoft.com/office/drawing/2014/main" id="{57C4605C-DD2F-49EB-BF76-5897F811A63F}"/>
+          <p:cNvPr id="49" name="Grupo 48">
+            <a:extLst>
+              <a:ext uri="{FF2B5EF4-FFF2-40B4-BE49-F238E27FC236}">
+                <a16:creationId xmlns:a16="http://schemas.microsoft.com/office/drawing/2014/main" id="{6225873D-7B12-4C10-B7C8-ECB96C354A21}"/>
               </a:ext>
             </a:extLst>
           </p:cNvPr>
@@ -3747,18 +3753,18 @@
         </p:nvGrpSpPr>
         <p:grpSpPr>
           <a:xfrm>
-            <a:off x="2629727" y="638641"/>
-            <a:ext cx="1502514" cy="1122318"/>
-            <a:chOff x="2873997" y="2009337"/>
-            <a:chExt cx="1502514" cy="1122318"/>
+            <a:off x="4777027" y="267035"/>
+            <a:ext cx="1513664" cy="1122318"/>
+            <a:chOff x="5734929" y="1954990"/>
+            <a:chExt cx="1513664" cy="1122318"/>
           </a:xfrm>
         </p:grpSpPr>
         <p:pic>
           <p:nvPicPr>
-            <p:cNvPr id="7" name="Gráfico 6" descr="Herramientas de minería">
+            <p:cNvPr id="15" name="Gráfico 14" descr="Reciclaje">
               <a:extLst>
                 <a:ext uri="{FF2B5EF4-FFF2-40B4-BE49-F238E27FC236}">
-                  <a16:creationId xmlns:a16="http://schemas.microsoft.com/office/drawing/2014/main" id="{35C7A36F-6176-48CE-A4B2-9594BB480CC4}"/>
+                  <a16:creationId xmlns:a16="http://schemas.microsoft.com/office/drawing/2014/main" id="{74E80EFE-00C9-4D65-B938-2738B7A718C5}"/>
                 </a:ext>
               </a:extLst>
             </p:cNvPr>
@@ -3775,102 +3781,6 @@
                 </a:ext>
                 <a:ext uri="{96DAC541-7B7A-43D3-8B79-37D633B846F1}">
                   <asvg:svgBlip xmlns:asvg="http://schemas.microsoft.com/office/drawing/2016/SVG/main" r:embed="rId10"/>
-                </a:ext>
-              </a:extLst>
-            </a:blip>
-            <a:stretch>
-              <a:fillRect/>
-            </a:stretch>
-          </p:blipFill>
-          <p:spPr>
-            <a:xfrm>
-              <a:off x="3913981" y="2082605"/>
-              <a:ext cx="462530" cy="462530"/>
-            </a:xfrm>
-            <a:prstGeom prst="rect">
-              <a:avLst/>
-            </a:prstGeom>
-          </p:spPr>
-        </p:pic>
-        <p:pic>
-          <p:nvPicPr>
-            <p:cNvPr id="26" name="Imagen 25">
-              <a:extLst>
-                <a:ext uri="{FF2B5EF4-FFF2-40B4-BE49-F238E27FC236}">
-                  <a16:creationId xmlns:a16="http://schemas.microsoft.com/office/drawing/2014/main" id="{E64CFEA6-EBD7-4547-8E90-FEC87B8253AF}"/>
-                </a:ext>
-              </a:extLst>
-            </p:cNvPr>
-            <p:cNvPicPr>
-              <a:picLocks noChangeAspect="1"/>
-            </p:cNvPicPr>
-            <p:nvPr/>
-          </p:nvPicPr>
-          <p:blipFill>
-            <a:blip r:embed="rId6">
-              <a:extLst>
-                <a:ext uri="{28A0092B-C50C-407E-A947-70E740481C1C}">
-                  <a14:useLocalDpi xmlns:a14="http://schemas.microsoft.com/office/drawing/2010/main" val="0"/>
-                </a:ext>
-              </a:extLst>
-            </a:blip>
-            <a:stretch>
-              <a:fillRect/>
-            </a:stretch>
-          </p:blipFill>
-          <p:spPr>
-            <a:xfrm flipH="1">
-              <a:off x="2873997" y="2009337"/>
-              <a:ext cx="1284117" cy="1122318"/>
-            </a:xfrm>
-            <a:prstGeom prst="rect">
-              <a:avLst/>
-            </a:prstGeom>
-          </p:spPr>
-        </p:pic>
-      </p:grpSp>
-      <p:grpSp>
-        <p:nvGrpSpPr>
-          <p:cNvPr id="49" name="Grupo 48">
-            <a:extLst>
-              <a:ext uri="{FF2B5EF4-FFF2-40B4-BE49-F238E27FC236}">
-                <a16:creationId xmlns:a16="http://schemas.microsoft.com/office/drawing/2014/main" id="{6225873D-7B12-4C10-B7C8-ECB96C354A21}"/>
-              </a:ext>
-            </a:extLst>
-          </p:cNvPr>
-          <p:cNvGrpSpPr/>
-          <p:nvPr/>
-        </p:nvGrpSpPr>
-        <p:grpSpPr>
-          <a:xfrm>
-            <a:off x="4811423" y="638641"/>
-            <a:ext cx="1513664" cy="1122318"/>
-            <a:chOff x="5734929" y="1954990"/>
-            <a:chExt cx="1513664" cy="1122318"/>
-          </a:xfrm>
-        </p:grpSpPr>
-        <p:pic>
-          <p:nvPicPr>
-            <p:cNvPr id="15" name="Gráfico 14" descr="Reciclaje">
-              <a:extLst>
-                <a:ext uri="{FF2B5EF4-FFF2-40B4-BE49-F238E27FC236}">
-                  <a16:creationId xmlns:a16="http://schemas.microsoft.com/office/drawing/2014/main" id="{74E80EFE-00C9-4D65-B938-2738B7A718C5}"/>
-                </a:ext>
-              </a:extLst>
-            </p:cNvPr>
-            <p:cNvPicPr>
-              <a:picLocks noChangeAspect="1"/>
-            </p:cNvPicPr>
-            <p:nvPr/>
-          </p:nvPicPr>
-          <p:blipFill>
-            <a:blip r:embed="rId11">
-              <a:extLst>
-                <a:ext uri="{28A0092B-C50C-407E-A947-70E740481C1C}">
-                  <a14:useLocalDpi xmlns:a14="http://schemas.microsoft.com/office/drawing/2010/main" val="0"/>
-                </a:ext>
-                <a:ext uri="{96DAC541-7B7A-43D3-8B79-37D633B846F1}">
-                  <asvg:svgBlip xmlns:asvg="http://schemas.microsoft.com/office/drawing/2016/SVG/main" r:embed="rId12"/>
                 </a:ext>
               </a:extLst>
             </a:blip>
@@ -3939,7 +3849,7 @@
         </p:nvGrpSpPr>
         <p:grpSpPr>
           <a:xfrm>
-            <a:off x="10034807" y="385312"/>
+            <a:off x="4777824" y="3634437"/>
             <a:ext cx="1430277" cy="1408319"/>
             <a:chOff x="5691407" y="465992"/>
             <a:chExt cx="1430277" cy="1408319"/>
@@ -3999,13 +3909,13 @@
             <p:nvPr/>
           </p:nvPicPr>
           <p:blipFill>
-            <a:blip r:embed="rId11">
+            <a:blip r:embed="rId9">
               <a:extLst>
                 <a:ext uri="{28A0092B-C50C-407E-A947-70E740481C1C}">
                   <a14:useLocalDpi xmlns:a14="http://schemas.microsoft.com/office/drawing/2010/main" val="0"/>
                 </a:ext>
                 <a:ext uri="{96DAC541-7B7A-43D3-8B79-37D633B846F1}">
-                  <asvg:svgBlip xmlns:asvg="http://schemas.microsoft.com/office/drawing/2016/SVG/main" r:embed="rId12"/>
+                  <asvg:svgBlip xmlns:asvg="http://schemas.microsoft.com/office/drawing/2016/SVG/main" r:embed="rId10"/>
                 </a:ext>
               </a:extLst>
             </a:blip>
@@ -4038,7 +3948,7 @@
         </p:nvGrpSpPr>
         <p:grpSpPr>
           <a:xfrm>
-            <a:off x="4012132" y="2094074"/>
+            <a:off x="4480435" y="1608485"/>
             <a:ext cx="1877299" cy="1806820"/>
             <a:chOff x="5416576" y="3203129"/>
             <a:chExt cx="1877299" cy="1806820"/>
@@ -4095,13 +4005,13 @@
             <p:nvPr/>
           </p:nvPicPr>
           <p:blipFill>
-            <a:blip r:embed="rId11">
+            <a:blip r:embed="rId9">
               <a:extLst>
                 <a:ext uri="{28A0092B-C50C-407E-A947-70E740481C1C}">
                   <a14:useLocalDpi xmlns:a14="http://schemas.microsoft.com/office/drawing/2010/main" val="0"/>
                 </a:ext>
                 <a:ext uri="{96DAC541-7B7A-43D3-8B79-37D633B846F1}">
-                  <asvg:svgBlip xmlns:asvg="http://schemas.microsoft.com/office/drawing/2016/SVG/main" r:embed="rId12"/>
+                  <asvg:svgBlip xmlns:asvg="http://schemas.microsoft.com/office/drawing/2016/SVG/main" r:embed="rId10"/>
                 </a:ext>
               </a:extLst>
             </a:blip>
@@ -4134,7 +4044,7 @@
         </p:nvGrpSpPr>
         <p:grpSpPr>
           <a:xfrm>
-            <a:off x="4839692" y="5096611"/>
+            <a:off x="4863772" y="5503094"/>
             <a:ext cx="1258383" cy="1211140"/>
             <a:chOff x="5747795" y="5009949"/>
             <a:chExt cx="1258383" cy="1211140"/>
@@ -4191,13 +4101,13 @@
             <p:nvPr/>
           </p:nvPicPr>
           <p:blipFill>
-            <a:blip r:embed="rId11">
+            <a:blip r:embed="rId9">
               <a:extLst>
                 <a:ext uri="{28A0092B-C50C-407E-A947-70E740481C1C}">
                   <a14:useLocalDpi xmlns:a14="http://schemas.microsoft.com/office/drawing/2010/main" val="0"/>
                 </a:ext>
                 <a:ext uri="{96DAC541-7B7A-43D3-8B79-37D633B846F1}">
-                  <asvg:svgBlip xmlns:asvg="http://schemas.microsoft.com/office/drawing/2016/SVG/main" r:embed="rId12"/>
+                  <asvg:svgBlip xmlns:asvg="http://schemas.microsoft.com/office/drawing/2016/SVG/main" r:embed="rId10"/>
                 </a:ext>
               </a:extLst>
             </a:blip>
@@ -4230,7 +4140,7 @@
         </p:nvGrpSpPr>
         <p:grpSpPr>
           <a:xfrm>
-            <a:off x="10059630" y="2270310"/>
+            <a:off x="2396585" y="3671573"/>
             <a:ext cx="1386755" cy="1342822"/>
             <a:chOff x="2830475" y="520339"/>
             <a:chExt cx="1386755" cy="1342822"/>
@@ -4290,13 +4200,13 @@
             <p:nvPr/>
           </p:nvPicPr>
           <p:blipFill>
-            <a:blip r:embed="rId9">
+            <a:blip r:embed="rId11">
               <a:extLst>
                 <a:ext uri="{28A0092B-C50C-407E-A947-70E740481C1C}">
                   <a14:useLocalDpi xmlns:a14="http://schemas.microsoft.com/office/drawing/2010/main" val="0"/>
                 </a:ext>
                 <a:ext uri="{96DAC541-7B7A-43D3-8B79-37D633B846F1}">
-                  <asvg:svgBlip xmlns:asvg="http://schemas.microsoft.com/office/drawing/2016/SVG/main" r:embed="rId10"/>
+                  <asvg:svgBlip xmlns:asvg="http://schemas.microsoft.com/office/drawing/2016/SVG/main" r:embed="rId12"/>
                 </a:ext>
               </a:extLst>
             </a:blip>
@@ -4329,7 +4239,7 @@
         </p:nvGrpSpPr>
         <p:grpSpPr>
           <a:xfrm>
-            <a:off x="1940437" y="2094074"/>
+            <a:off x="1906041" y="1722468"/>
             <a:ext cx="1892851" cy="1806820"/>
             <a:chOff x="2555644" y="3257476"/>
             <a:chExt cx="1892851" cy="1806820"/>
@@ -4386,13 +4296,13 @@
             <p:nvPr/>
           </p:nvPicPr>
           <p:blipFill>
-            <a:blip r:embed="rId9">
+            <a:blip r:embed="rId11">
               <a:extLst>
                 <a:ext uri="{28A0092B-C50C-407E-A947-70E740481C1C}">
                   <a14:useLocalDpi xmlns:a14="http://schemas.microsoft.com/office/drawing/2010/main" val="0"/>
                 </a:ext>
                 <a:ext uri="{96DAC541-7B7A-43D3-8B79-37D633B846F1}">
-                  <asvg:svgBlip xmlns:asvg="http://schemas.microsoft.com/office/drawing/2016/SVG/main" r:embed="rId10"/>
+                  <asvg:svgBlip xmlns:asvg="http://schemas.microsoft.com/office/drawing/2016/SVG/main" r:embed="rId12"/>
                 </a:ext>
               </a:extLst>
             </a:blip>
@@ -4425,7 +4335,7 @@
         </p:nvGrpSpPr>
         <p:grpSpPr>
           <a:xfrm>
-            <a:off x="2886863" y="5064296"/>
+            <a:off x="2910943" y="5470779"/>
             <a:ext cx="1258383" cy="1211140"/>
             <a:chOff x="2886863" y="5064296"/>
             <a:chExt cx="1258383" cy="1211140"/>
@@ -4482,13 +4392,13 @@
             <p:nvPr/>
           </p:nvPicPr>
           <p:blipFill>
-            <a:blip r:embed="rId9">
+            <a:blip r:embed="rId11">
               <a:extLst>
                 <a:ext uri="{28A0092B-C50C-407E-A947-70E740481C1C}">
                   <a14:useLocalDpi xmlns:a14="http://schemas.microsoft.com/office/drawing/2010/main" val="0"/>
                 </a:ext>
                 <a:ext uri="{96DAC541-7B7A-43D3-8B79-37D633B846F1}">
-                  <asvg:svgBlip xmlns:asvg="http://schemas.microsoft.com/office/drawing/2016/SVG/main" r:embed="rId10"/>
+                  <asvg:svgBlip xmlns:asvg="http://schemas.microsoft.com/office/drawing/2016/SVG/main" r:embed="rId12"/>
                 </a:ext>
               </a:extLst>
             </a:blip>
@@ -4507,10 +4417,2420 @@
           </p:spPr>
         </p:pic>
       </p:grpSp>
+      <p:grpSp>
+        <p:nvGrpSpPr>
+          <p:cNvPr id="11" name="Grupo 10">
+            <a:extLst>
+              <a:ext uri="{FF2B5EF4-FFF2-40B4-BE49-F238E27FC236}">
+                <a16:creationId xmlns:a16="http://schemas.microsoft.com/office/drawing/2014/main" id="{3E18D9A9-0E14-42BA-8F0E-3761138485DE}"/>
+              </a:ext>
+            </a:extLst>
+          </p:cNvPr>
+          <p:cNvGrpSpPr/>
+          <p:nvPr/>
+        </p:nvGrpSpPr>
+        <p:grpSpPr>
+          <a:xfrm>
+            <a:off x="6928701" y="3634436"/>
+            <a:ext cx="1418280" cy="1327639"/>
+            <a:chOff x="9981106" y="52963"/>
+            <a:chExt cx="1418280" cy="1327639"/>
+          </a:xfrm>
+        </p:grpSpPr>
+        <p:pic>
+          <p:nvPicPr>
+            <p:cNvPr id="5" name="Gráfico 4" descr="Lupa">
+              <a:extLst>
+                <a:ext uri="{FF2B5EF4-FFF2-40B4-BE49-F238E27FC236}">
+                  <a16:creationId xmlns:a16="http://schemas.microsoft.com/office/drawing/2014/main" id="{CC794D29-CA5A-4FEC-9E2F-5EDFB6158835}"/>
+                </a:ext>
+              </a:extLst>
+            </p:cNvPr>
+            <p:cNvPicPr>
+              <a:picLocks noChangeAspect="1"/>
+            </p:cNvPicPr>
+            <p:nvPr/>
+          </p:nvPicPr>
+          <p:blipFill>
+            <a:blip r:embed="rId13">
+              <a:extLst>
+                <a:ext uri="{28A0092B-C50C-407E-A947-70E740481C1C}">
+                  <a14:useLocalDpi xmlns:a14="http://schemas.microsoft.com/office/drawing/2010/main" val="0"/>
+                </a:ext>
+                <a:ext uri="{96DAC541-7B7A-43D3-8B79-37D633B846F1}">
+                  <asvg:svgBlip xmlns:asvg="http://schemas.microsoft.com/office/drawing/2016/SVG/main" r:embed="rId14"/>
+                </a:ext>
+              </a:extLst>
+            </a:blip>
+            <a:stretch>
+              <a:fillRect/>
+            </a:stretch>
+          </p:blipFill>
+          <p:spPr>
+            <a:xfrm>
+              <a:off x="10910478" y="885473"/>
+              <a:ext cx="488908" cy="488908"/>
+            </a:xfrm>
+            <a:prstGeom prst="rect">
+              <a:avLst/>
+            </a:prstGeom>
+          </p:spPr>
+        </p:pic>
+        <p:pic>
+          <p:nvPicPr>
+            <p:cNvPr id="52" name="Gráfico 51" descr="Hombre">
+              <a:extLst>
+                <a:ext uri="{FF2B5EF4-FFF2-40B4-BE49-F238E27FC236}">
+                  <a16:creationId xmlns:a16="http://schemas.microsoft.com/office/drawing/2014/main" id="{723F85B1-DDDF-4D2E-814A-CC7F5603411C}"/>
+                </a:ext>
+              </a:extLst>
+            </p:cNvPr>
+            <p:cNvPicPr>
+              <a:picLocks noChangeAspect="1"/>
+            </p:cNvPicPr>
+            <p:nvPr/>
+          </p:nvPicPr>
+          <p:blipFill>
+            <a:blip r:embed="rId2">
+              <a:extLst>
+                <a:ext uri="{28A0092B-C50C-407E-A947-70E740481C1C}">
+                  <a14:useLocalDpi xmlns:a14="http://schemas.microsoft.com/office/drawing/2010/main" val="0"/>
+                </a:ext>
+                <a:ext uri="{96DAC541-7B7A-43D3-8B79-37D633B846F1}">
+                  <asvg:svgBlip xmlns:asvg="http://schemas.microsoft.com/office/drawing/2016/SVG/main" r:embed="rId3"/>
+                </a:ext>
+              </a:extLst>
+            </a:blip>
+            <a:stretch>
+              <a:fillRect/>
+            </a:stretch>
+          </p:blipFill>
+          <p:spPr>
+            <a:xfrm>
+              <a:off x="9981106" y="52963"/>
+              <a:ext cx="1327639" cy="1327639"/>
+            </a:xfrm>
+            <a:prstGeom prst="rect">
+              <a:avLst/>
+            </a:prstGeom>
+          </p:spPr>
+        </p:pic>
+      </p:grpSp>
+      <p:grpSp>
+        <p:nvGrpSpPr>
+          <p:cNvPr id="57" name="Grupo 56">
+            <a:extLst>
+              <a:ext uri="{FF2B5EF4-FFF2-40B4-BE49-F238E27FC236}">
+                <a16:creationId xmlns:a16="http://schemas.microsoft.com/office/drawing/2014/main" id="{EBF6763C-CC4C-4D07-BBA4-A899A33BFE0A}"/>
+              </a:ext>
+            </a:extLst>
+          </p:cNvPr>
+          <p:cNvGrpSpPr/>
+          <p:nvPr/>
+        </p:nvGrpSpPr>
+        <p:grpSpPr>
+          <a:xfrm>
+            <a:off x="2595331" y="267035"/>
+            <a:ext cx="1502514" cy="1122318"/>
+            <a:chOff x="2873997" y="2009337"/>
+            <a:chExt cx="1502514" cy="1122318"/>
+          </a:xfrm>
+        </p:grpSpPr>
+        <p:pic>
+          <p:nvPicPr>
+            <p:cNvPr id="58" name="Gráfico 57" descr="Herramientas de minería">
+              <a:extLst>
+                <a:ext uri="{FF2B5EF4-FFF2-40B4-BE49-F238E27FC236}">
+                  <a16:creationId xmlns:a16="http://schemas.microsoft.com/office/drawing/2014/main" id="{A9D5C3C7-E5F6-4CE6-8523-D6EA88C0BCA1}"/>
+                </a:ext>
+              </a:extLst>
+            </p:cNvPr>
+            <p:cNvPicPr>
+              <a:picLocks noChangeAspect="1"/>
+            </p:cNvPicPr>
+            <p:nvPr/>
+          </p:nvPicPr>
+          <p:blipFill>
+            <a:blip r:embed="rId11">
+              <a:extLst>
+                <a:ext uri="{28A0092B-C50C-407E-A947-70E740481C1C}">
+                  <a14:useLocalDpi xmlns:a14="http://schemas.microsoft.com/office/drawing/2010/main" val="0"/>
+                </a:ext>
+                <a:ext uri="{96DAC541-7B7A-43D3-8B79-37D633B846F1}">
+                  <asvg:svgBlip xmlns:asvg="http://schemas.microsoft.com/office/drawing/2016/SVG/main" r:embed="rId12"/>
+                </a:ext>
+              </a:extLst>
+            </a:blip>
+            <a:stretch>
+              <a:fillRect/>
+            </a:stretch>
+          </p:blipFill>
+          <p:spPr>
+            <a:xfrm>
+              <a:off x="3913981" y="2082605"/>
+              <a:ext cx="462530" cy="462530"/>
+            </a:xfrm>
+            <a:prstGeom prst="rect">
+              <a:avLst/>
+            </a:prstGeom>
+          </p:spPr>
+        </p:pic>
+        <p:pic>
+          <p:nvPicPr>
+            <p:cNvPr id="59" name="Imagen 58">
+              <a:extLst>
+                <a:ext uri="{FF2B5EF4-FFF2-40B4-BE49-F238E27FC236}">
+                  <a16:creationId xmlns:a16="http://schemas.microsoft.com/office/drawing/2014/main" id="{C7098400-9A7D-416F-BF0A-01DEE7A69BFB}"/>
+                </a:ext>
+              </a:extLst>
+            </p:cNvPr>
+            <p:cNvPicPr>
+              <a:picLocks noChangeAspect="1"/>
+            </p:cNvPicPr>
+            <p:nvPr/>
+          </p:nvPicPr>
+          <p:blipFill>
+            <a:blip r:embed="rId6">
+              <a:extLst>
+                <a:ext uri="{28A0092B-C50C-407E-A947-70E740481C1C}">
+                  <a14:useLocalDpi xmlns:a14="http://schemas.microsoft.com/office/drawing/2010/main" val="0"/>
+                </a:ext>
+              </a:extLst>
+            </a:blip>
+            <a:stretch>
+              <a:fillRect/>
+            </a:stretch>
+          </p:blipFill>
+          <p:spPr>
+            <a:xfrm flipH="1">
+              <a:off x="2873997" y="2009337"/>
+              <a:ext cx="1284117" cy="1122318"/>
+            </a:xfrm>
+            <a:prstGeom prst="rect">
+              <a:avLst/>
+            </a:prstGeom>
+          </p:spPr>
+        </p:pic>
+      </p:grpSp>
+      <p:grpSp>
+        <p:nvGrpSpPr>
+          <p:cNvPr id="10" name="Grupo 9">
+            <a:extLst>
+              <a:ext uri="{FF2B5EF4-FFF2-40B4-BE49-F238E27FC236}">
+                <a16:creationId xmlns:a16="http://schemas.microsoft.com/office/drawing/2014/main" id="{2B8466D4-9285-41CD-B136-6253B0A26BA3}"/>
+              </a:ext>
+            </a:extLst>
+          </p:cNvPr>
+          <p:cNvGrpSpPr/>
+          <p:nvPr/>
+        </p:nvGrpSpPr>
+        <p:grpSpPr>
+          <a:xfrm>
+            <a:off x="6625919" y="1608485"/>
+            <a:ext cx="1986253" cy="1806820"/>
+            <a:chOff x="9438318" y="1285585"/>
+            <a:chExt cx="1986253" cy="1806820"/>
+          </a:xfrm>
+        </p:grpSpPr>
+        <p:pic>
+          <p:nvPicPr>
+            <p:cNvPr id="55" name="Imagen 54">
+              <a:extLst>
+                <a:ext uri="{FF2B5EF4-FFF2-40B4-BE49-F238E27FC236}">
+                  <a16:creationId xmlns:a16="http://schemas.microsoft.com/office/drawing/2014/main" id="{47720EDC-95FF-43CF-A71C-94F7643317CF}"/>
+                </a:ext>
+              </a:extLst>
+            </p:cNvPr>
+            <p:cNvPicPr>
+              <a:picLocks noChangeAspect="1"/>
+            </p:cNvPicPr>
+            <p:nvPr/>
+          </p:nvPicPr>
+          <p:blipFill>
+            <a:blip r:embed="rId7">
+              <a:extLst>
+                <a:ext uri="{28A0092B-C50C-407E-A947-70E740481C1C}">
+                  <a14:useLocalDpi xmlns:a14="http://schemas.microsoft.com/office/drawing/2010/main" val="0"/>
+                </a:ext>
+              </a:extLst>
+            </a:blip>
+            <a:stretch>
+              <a:fillRect/>
+            </a:stretch>
+          </p:blipFill>
+          <p:spPr>
+            <a:xfrm>
+              <a:off x="9438318" y="1285585"/>
+              <a:ext cx="1877299" cy="1806820"/>
+            </a:xfrm>
+            <a:prstGeom prst="rect">
+              <a:avLst/>
+            </a:prstGeom>
+          </p:spPr>
+        </p:pic>
+        <p:pic>
+          <p:nvPicPr>
+            <p:cNvPr id="66" name="Gráfico 65" descr="Lupa">
+              <a:extLst>
+                <a:ext uri="{FF2B5EF4-FFF2-40B4-BE49-F238E27FC236}">
+                  <a16:creationId xmlns:a16="http://schemas.microsoft.com/office/drawing/2014/main" id="{5B8C4D34-5276-4A25-9C22-86F8F0942CFF}"/>
+                </a:ext>
+              </a:extLst>
+            </p:cNvPr>
+            <p:cNvPicPr>
+              <a:picLocks noChangeAspect="1"/>
+            </p:cNvPicPr>
+            <p:nvPr/>
+          </p:nvPicPr>
+          <p:blipFill>
+            <a:blip r:embed="rId13">
+              <a:extLst>
+                <a:ext uri="{28A0092B-C50C-407E-A947-70E740481C1C}">
+                  <a14:useLocalDpi xmlns:a14="http://schemas.microsoft.com/office/drawing/2010/main" val="0"/>
+                </a:ext>
+                <a:ext uri="{96DAC541-7B7A-43D3-8B79-37D633B846F1}">
+                  <asvg:svgBlip xmlns:asvg="http://schemas.microsoft.com/office/drawing/2016/SVG/main" r:embed="rId14"/>
+                </a:ext>
+              </a:extLst>
+            </a:blip>
+            <a:stretch>
+              <a:fillRect/>
+            </a:stretch>
+          </p:blipFill>
+          <p:spPr>
+            <a:xfrm>
+              <a:off x="10935663" y="2439101"/>
+              <a:ext cx="488908" cy="488908"/>
+            </a:xfrm>
+            <a:prstGeom prst="rect">
+              <a:avLst/>
+            </a:prstGeom>
+          </p:spPr>
+        </p:pic>
+      </p:grpSp>
+      <p:grpSp>
+        <p:nvGrpSpPr>
+          <p:cNvPr id="8" name="Grupo 7">
+            <a:extLst>
+              <a:ext uri="{FF2B5EF4-FFF2-40B4-BE49-F238E27FC236}">
+                <a16:creationId xmlns:a16="http://schemas.microsoft.com/office/drawing/2014/main" id="{0E05837E-0E2D-43C3-B910-7E2CF9A642A6}"/>
+              </a:ext>
+            </a:extLst>
+          </p:cNvPr>
+          <p:cNvGrpSpPr/>
+          <p:nvPr/>
+        </p:nvGrpSpPr>
+        <p:grpSpPr>
+          <a:xfrm>
+            <a:off x="6931949" y="193728"/>
+            <a:ext cx="1524461" cy="1180653"/>
+            <a:chOff x="10485862" y="3427119"/>
+            <a:chExt cx="1524461" cy="1180653"/>
+          </a:xfrm>
+        </p:grpSpPr>
+        <p:pic>
+          <p:nvPicPr>
+            <p:cNvPr id="62" name="Imagen 61">
+              <a:extLst>
+                <a:ext uri="{FF2B5EF4-FFF2-40B4-BE49-F238E27FC236}">
+                  <a16:creationId xmlns:a16="http://schemas.microsoft.com/office/drawing/2014/main" id="{FCC5154D-7860-45F5-AB08-A945FC7E9225}"/>
+                </a:ext>
+              </a:extLst>
+            </p:cNvPr>
+            <p:cNvPicPr>
+              <a:picLocks noChangeAspect="1"/>
+            </p:cNvPicPr>
+            <p:nvPr/>
+          </p:nvPicPr>
+          <p:blipFill>
+            <a:blip r:embed="rId6">
+              <a:extLst>
+                <a:ext uri="{28A0092B-C50C-407E-A947-70E740481C1C}">
+                  <a14:useLocalDpi xmlns:a14="http://schemas.microsoft.com/office/drawing/2010/main" val="0"/>
+                </a:ext>
+              </a:extLst>
+            </a:blip>
+            <a:stretch>
+              <a:fillRect/>
+            </a:stretch>
+          </p:blipFill>
+          <p:spPr>
+            <a:xfrm flipH="1">
+              <a:off x="10485862" y="3485454"/>
+              <a:ext cx="1284117" cy="1122318"/>
+            </a:xfrm>
+            <a:prstGeom prst="rect">
+              <a:avLst/>
+            </a:prstGeom>
+          </p:spPr>
+        </p:pic>
+        <p:pic>
+          <p:nvPicPr>
+            <p:cNvPr id="67" name="Gráfico 66" descr="Lupa">
+              <a:extLst>
+                <a:ext uri="{FF2B5EF4-FFF2-40B4-BE49-F238E27FC236}">
+                  <a16:creationId xmlns:a16="http://schemas.microsoft.com/office/drawing/2014/main" id="{3A9B8581-4890-4AC8-9C35-CADF3ABBBDAE}"/>
+                </a:ext>
+              </a:extLst>
+            </p:cNvPr>
+            <p:cNvPicPr>
+              <a:picLocks noChangeAspect="1"/>
+            </p:cNvPicPr>
+            <p:nvPr/>
+          </p:nvPicPr>
+          <p:blipFill>
+            <a:blip r:embed="rId13">
+              <a:extLst>
+                <a:ext uri="{28A0092B-C50C-407E-A947-70E740481C1C}">
+                  <a14:useLocalDpi xmlns:a14="http://schemas.microsoft.com/office/drawing/2010/main" val="0"/>
+                </a:ext>
+                <a:ext uri="{96DAC541-7B7A-43D3-8B79-37D633B846F1}">
+                  <asvg:svgBlip xmlns:asvg="http://schemas.microsoft.com/office/drawing/2016/SVG/main" r:embed="rId14"/>
+                </a:ext>
+              </a:extLst>
+            </a:blip>
+            <a:stretch>
+              <a:fillRect/>
+            </a:stretch>
+          </p:blipFill>
+          <p:spPr>
+            <a:xfrm>
+              <a:off x="11521415" y="3427119"/>
+              <a:ext cx="488908" cy="488908"/>
+            </a:xfrm>
+            <a:prstGeom prst="rect">
+              <a:avLst/>
+            </a:prstGeom>
+          </p:spPr>
+        </p:pic>
+      </p:grpSp>
+      <p:grpSp>
+        <p:nvGrpSpPr>
+          <p:cNvPr id="6" name="Grupo 5">
+            <a:extLst>
+              <a:ext uri="{FF2B5EF4-FFF2-40B4-BE49-F238E27FC236}">
+                <a16:creationId xmlns:a16="http://schemas.microsoft.com/office/drawing/2014/main" id="{9093C769-77CB-4002-BB62-7C013A10B08D}"/>
+              </a:ext>
+            </a:extLst>
+          </p:cNvPr>
+          <p:cNvGrpSpPr/>
+          <p:nvPr/>
+        </p:nvGrpSpPr>
+        <p:grpSpPr>
+          <a:xfrm>
+            <a:off x="7088598" y="5416432"/>
+            <a:ext cx="1258383" cy="1211140"/>
+            <a:chOff x="10222420" y="5096611"/>
+            <a:chExt cx="1258383" cy="1211140"/>
+          </a:xfrm>
+        </p:grpSpPr>
+        <p:pic>
+          <p:nvPicPr>
+            <p:cNvPr id="64" name="Imagen 63">
+              <a:extLst>
+                <a:ext uri="{FF2B5EF4-FFF2-40B4-BE49-F238E27FC236}">
+                  <a16:creationId xmlns:a16="http://schemas.microsoft.com/office/drawing/2014/main" id="{05D92DFC-1DD1-4B81-9132-B5658F7C7CA8}"/>
+                </a:ext>
+              </a:extLst>
+            </p:cNvPr>
+            <p:cNvPicPr>
+              <a:picLocks noChangeAspect="1"/>
+            </p:cNvPicPr>
+            <p:nvPr/>
+          </p:nvPicPr>
+          <p:blipFill>
+            <a:blip r:embed="rId8">
+              <a:extLst>
+                <a:ext uri="{28A0092B-C50C-407E-A947-70E740481C1C}">
+                  <a14:useLocalDpi xmlns:a14="http://schemas.microsoft.com/office/drawing/2010/main" val="0"/>
+                </a:ext>
+              </a:extLst>
+            </a:blip>
+            <a:stretch>
+              <a:fillRect/>
+            </a:stretch>
+          </p:blipFill>
+          <p:spPr>
+            <a:xfrm>
+              <a:off x="10222420" y="5096611"/>
+              <a:ext cx="1258383" cy="1211140"/>
+            </a:xfrm>
+            <a:prstGeom prst="rect">
+              <a:avLst/>
+            </a:prstGeom>
+          </p:spPr>
+        </p:pic>
+        <p:pic>
+          <p:nvPicPr>
+            <p:cNvPr id="68" name="Gráfico 67" descr="Lupa">
+              <a:extLst>
+                <a:ext uri="{FF2B5EF4-FFF2-40B4-BE49-F238E27FC236}">
+                  <a16:creationId xmlns:a16="http://schemas.microsoft.com/office/drawing/2014/main" id="{BFB52961-0830-4461-B352-E58F5BECF8C0}"/>
+                </a:ext>
+              </a:extLst>
+            </p:cNvPr>
+            <p:cNvPicPr>
+              <a:picLocks noChangeAspect="1"/>
+            </p:cNvPicPr>
+            <p:nvPr/>
+          </p:nvPicPr>
+          <p:blipFill>
+            <a:blip r:embed="rId13">
+              <a:extLst>
+                <a:ext uri="{28A0092B-C50C-407E-A947-70E740481C1C}">
+                  <a14:useLocalDpi xmlns:a14="http://schemas.microsoft.com/office/drawing/2010/main" val="0"/>
+                </a:ext>
+                <a:ext uri="{96DAC541-7B7A-43D3-8B79-37D633B846F1}">
+                  <asvg:svgBlip xmlns:asvg="http://schemas.microsoft.com/office/drawing/2016/SVG/main" r:embed="rId14"/>
+                </a:ext>
+              </a:extLst>
+            </a:blip>
+            <a:stretch>
+              <a:fillRect/>
+            </a:stretch>
+          </p:blipFill>
+          <p:spPr>
+            <a:xfrm>
+              <a:off x="10987538" y="5253650"/>
+              <a:ext cx="385157" cy="385157"/>
+            </a:xfrm>
+            <a:prstGeom prst="rect">
+              <a:avLst/>
+            </a:prstGeom>
+          </p:spPr>
+        </p:pic>
+      </p:grpSp>
+      <p:sp>
+        <p:nvSpPr>
+          <p:cNvPr id="12" name="CuadroTexto 11">
+            <a:extLst>
+              <a:ext uri="{FF2B5EF4-FFF2-40B4-BE49-F238E27FC236}">
+                <a16:creationId xmlns:a16="http://schemas.microsoft.com/office/drawing/2014/main" id="{7FA5ECCE-5A7D-4E9F-817D-B72E31369845}"/>
+              </a:ext>
+            </a:extLst>
+          </p:cNvPr>
+          <p:cNvSpPr txBox="1"/>
+          <p:nvPr/>
+        </p:nvSpPr>
+        <p:spPr>
+          <a:xfrm>
+            <a:off x="9633284" y="5891683"/>
+            <a:ext cx="1512277" cy="369332"/>
+          </a:xfrm>
+          <a:prstGeom prst="rect">
+            <a:avLst/>
+          </a:prstGeom>
+          <a:noFill/>
+        </p:spPr>
+        <p:txBody>
+          <a:bodyPr wrap="square" rtlCol="0">
+            <a:spAutoFit/>
+          </a:bodyPr>
+          <a:lstStyle/>
+          <a:p>
+            <a:r>
+              <a:rPr lang="es-CR" dirty="0"/>
+              <a:t>Cita</a:t>
+            </a:r>
+          </a:p>
+        </p:txBody>
+      </p:sp>
+      <p:sp>
+        <p:nvSpPr>
+          <p:cNvPr id="69" name="CuadroTexto 68">
+            <a:extLst>
+              <a:ext uri="{FF2B5EF4-FFF2-40B4-BE49-F238E27FC236}">
+                <a16:creationId xmlns:a16="http://schemas.microsoft.com/office/drawing/2014/main" id="{1D012BA6-2C5C-40CA-AC9D-7832B76B0B81}"/>
+              </a:ext>
+            </a:extLst>
+          </p:cNvPr>
+          <p:cNvSpPr txBox="1"/>
+          <p:nvPr/>
+        </p:nvSpPr>
+        <p:spPr>
+          <a:xfrm>
+            <a:off x="9633283" y="4270765"/>
+            <a:ext cx="1512277" cy="369332"/>
+          </a:xfrm>
+          <a:prstGeom prst="rect">
+            <a:avLst/>
+          </a:prstGeom>
+          <a:noFill/>
+        </p:spPr>
+        <p:txBody>
+          <a:bodyPr wrap="square" rtlCol="0">
+            <a:spAutoFit/>
+          </a:bodyPr>
+          <a:lstStyle/>
+          <a:p>
+            <a:r>
+              <a:rPr lang="es-CR" dirty="0"/>
+              <a:t>Paciente</a:t>
+            </a:r>
+          </a:p>
+        </p:txBody>
+      </p:sp>
+      <p:sp>
+        <p:nvSpPr>
+          <p:cNvPr id="70" name="CuadroTexto 69">
+            <a:extLst>
+              <a:ext uri="{FF2B5EF4-FFF2-40B4-BE49-F238E27FC236}">
+                <a16:creationId xmlns:a16="http://schemas.microsoft.com/office/drawing/2014/main" id="{43CFCC9E-7FEE-4A50-8DE2-0F5018F29440}"/>
+              </a:ext>
+            </a:extLst>
+          </p:cNvPr>
+          <p:cNvSpPr txBox="1"/>
+          <p:nvPr/>
+        </p:nvSpPr>
+        <p:spPr>
+          <a:xfrm>
+            <a:off x="9785681" y="2336907"/>
+            <a:ext cx="1512277" cy="646331"/>
+          </a:xfrm>
+          <a:prstGeom prst="rect">
+            <a:avLst/>
+          </a:prstGeom>
+          <a:noFill/>
+        </p:spPr>
+        <p:txBody>
+          <a:bodyPr wrap="square" rtlCol="0">
+            <a:spAutoFit/>
+          </a:bodyPr>
+          <a:lstStyle/>
+          <a:p>
+            <a:r>
+              <a:rPr lang="es-CR" dirty="0"/>
+              <a:t>Plan de Ejercicios</a:t>
+            </a:r>
+          </a:p>
+        </p:txBody>
+      </p:sp>
+      <p:sp>
+        <p:nvSpPr>
+          <p:cNvPr id="72" name="CuadroTexto 71">
+            <a:extLst>
+              <a:ext uri="{FF2B5EF4-FFF2-40B4-BE49-F238E27FC236}">
+                <a16:creationId xmlns:a16="http://schemas.microsoft.com/office/drawing/2014/main" id="{E0C2EA29-71B8-4428-903B-A195F322CFE4}"/>
+              </a:ext>
+            </a:extLst>
+          </p:cNvPr>
+          <p:cNvSpPr txBox="1"/>
+          <p:nvPr/>
+        </p:nvSpPr>
+        <p:spPr>
+          <a:xfrm>
+            <a:off x="9785682" y="835036"/>
+            <a:ext cx="1512277" cy="646331"/>
+          </a:xfrm>
+          <a:prstGeom prst="rect">
+            <a:avLst/>
+          </a:prstGeom>
+          <a:noFill/>
+        </p:spPr>
+        <p:txBody>
+          <a:bodyPr wrap="square" rtlCol="0">
+            <a:spAutoFit/>
+          </a:bodyPr>
+          <a:lstStyle/>
+          <a:p>
+            <a:r>
+              <a:rPr lang="es-CR" dirty="0"/>
+              <a:t>Plan de Tratamiento</a:t>
+            </a:r>
+          </a:p>
+        </p:txBody>
+      </p:sp>
     </p:spTree>
     <p:extLst>
       <p:ext uri="{BB962C8B-B14F-4D97-AF65-F5344CB8AC3E}">
         <p14:creationId xmlns:p14="http://schemas.microsoft.com/office/powerpoint/2010/main" val="997581883"/>
+      </p:ext>
+    </p:extLst>
+  </p:cSld>
+  <p:clrMapOvr>
+    <a:masterClrMapping/>
+  </p:clrMapOvr>
+</p:sld>
+</file>
+
+<file path=ppt/slides/slide2.xml><?xml version="1.0" encoding="utf-8"?>
+<p:sld xmlns:a="http://schemas.openxmlformats.org/drawingml/2006/main" xmlns:r="http://schemas.openxmlformats.org/officeDocument/2006/relationships" xmlns:p="http://schemas.openxmlformats.org/presentationml/2006/main">
+  <p:cSld>
+    <p:spTree>
+      <p:nvGrpSpPr>
+        <p:cNvPr id="1" name=""/>
+        <p:cNvGrpSpPr/>
+        <p:nvPr/>
+      </p:nvGrpSpPr>
+      <p:grpSpPr>
+        <a:xfrm>
+          <a:off x="0" y="0"/>
+          <a:ext cx="0" cy="0"/>
+          <a:chOff x="0" y="0"/>
+          <a:chExt cx="0" cy="0"/>
+        </a:xfrm>
+      </p:grpSpPr>
+      <p:sp>
+        <p:nvSpPr>
+          <p:cNvPr id="70" name="CuadroTexto 69">
+            <a:extLst>
+              <a:ext uri="{FF2B5EF4-FFF2-40B4-BE49-F238E27FC236}">
+                <a16:creationId xmlns:a16="http://schemas.microsoft.com/office/drawing/2014/main" id="{BE9EE029-6543-46E9-9645-B60A032126EF}"/>
+              </a:ext>
+            </a:extLst>
+          </p:cNvPr>
+          <p:cNvSpPr txBox="1"/>
+          <p:nvPr/>
+        </p:nvSpPr>
+        <p:spPr>
+          <a:xfrm>
+            <a:off x="9633284" y="5891683"/>
+            <a:ext cx="1512277" cy="369332"/>
+          </a:xfrm>
+          <a:prstGeom prst="rect">
+            <a:avLst/>
+          </a:prstGeom>
+          <a:noFill/>
+        </p:spPr>
+        <p:txBody>
+          <a:bodyPr wrap="square" rtlCol="0">
+            <a:spAutoFit/>
+          </a:bodyPr>
+          <a:lstStyle/>
+          <a:p>
+            <a:r>
+              <a:rPr lang="es-CR" dirty="0"/>
+              <a:t>Ejercicio</a:t>
+            </a:r>
+          </a:p>
+        </p:txBody>
+      </p:sp>
+      <p:sp>
+        <p:nvSpPr>
+          <p:cNvPr id="71" name="CuadroTexto 70">
+            <a:extLst>
+              <a:ext uri="{FF2B5EF4-FFF2-40B4-BE49-F238E27FC236}">
+                <a16:creationId xmlns:a16="http://schemas.microsoft.com/office/drawing/2014/main" id="{DF3F3270-56DA-4B2E-9A97-403D873CB1C9}"/>
+              </a:ext>
+            </a:extLst>
+          </p:cNvPr>
+          <p:cNvSpPr txBox="1"/>
+          <p:nvPr/>
+        </p:nvSpPr>
+        <p:spPr>
+          <a:xfrm>
+            <a:off x="9633283" y="4270765"/>
+            <a:ext cx="1512277" cy="369332"/>
+          </a:xfrm>
+          <a:prstGeom prst="rect">
+            <a:avLst/>
+          </a:prstGeom>
+          <a:noFill/>
+        </p:spPr>
+        <p:txBody>
+          <a:bodyPr wrap="square" rtlCol="0">
+            <a:spAutoFit/>
+          </a:bodyPr>
+          <a:lstStyle/>
+          <a:p>
+            <a:r>
+              <a:rPr lang="es-CR" dirty="0"/>
+              <a:t>Material</a:t>
+            </a:r>
+          </a:p>
+        </p:txBody>
+      </p:sp>
+      <p:sp>
+        <p:nvSpPr>
+          <p:cNvPr id="72" name="CuadroTexto 71">
+            <a:extLst>
+              <a:ext uri="{FF2B5EF4-FFF2-40B4-BE49-F238E27FC236}">
+                <a16:creationId xmlns:a16="http://schemas.microsoft.com/office/drawing/2014/main" id="{F1066537-279E-425F-A2D8-46220BF9F90F}"/>
+              </a:ext>
+            </a:extLst>
+          </p:cNvPr>
+          <p:cNvSpPr txBox="1"/>
+          <p:nvPr/>
+        </p:nvSpPr>
+        <p:spPr>
+          <a:xfrm>
+            <a:off x="9785681" y="2336907"/>
+            <a:ext cx="1512277" cy="369332"/>
+          </a:xfrm>
+          <a:prstGeom prst="rect">
+            <a:avLst/>
+          </a:prstGeom>
+          <a:noFill/>
+        </p:spPr>
+        <p:txBody>
+          <a:bodyPr wrap="square" rtlCol="0">
+            <a:spAutoFit/>
+          </a:bodyPr>
+          <a:lstStyle/>
+          <a:p>
+            <a:r>
+              <a:rPr lang="es-CR" dirty="0"/>
+              <a:t>Antecedente</a:t>
+            </a:r>
+          </a:p>
+        </p:txBody>
+      </p:sp>
+      <p:sp>
+        <p:nvSpPr>
+          <p:cNvPr id="73" name="CuadroTexto 72">
+            <a:extLst>
+              <a:ext uri="{FF2B5EF4-FFF2-40B4-BE49-F238E27FC236}">
+                <a16:creationId xmlns:a16="http://schemas.microsoft.com/office/drawing/2014/main" id="{6EC028FE-D6EC-4240-AE97-059C203D0E4C}"/>
+              </a:ext>
+            </a:extLst>
+          </p:cNvPr>
+          <p:cNvSpPr txBox="1"/>
+          <p:nvPr/>
+        </p:nvSpPr>
+        <p:spPr>
+          <a:xfrm>
+            <a:off x="9785682" y="835036"/>
+            <a:ext cx="1512277" cy="369332"/>
+          </a:xfrm>
+          <a:prstGeom prst="rect">
+            <a:avLst/>
+          </a:prstGeom>
+          <a:noFill/>
+        </p:spPr>
+        <p:txBody>
+          <a:bodyPr wrap="square" rtlCol="0">
+            <a:spAutoFit/>
+          </a:bodyPr>
+          <a:lstStyle/>
+          <a:p>
+            <a:r>
+              <a:rPr lang="es-CR" dirty="0" err="1"/>
+              <a:t>Tecnica</a:t>
+            </a:r>
+            <a:endParaRPr lang="es-CR" dirty="0"/>
+          </a:p>
+        </p:txBody>
+      </p:sp>
+      <p:grpSp>
+        <p:nvGrpSpPr>
+          <p:cNvPr id="53" name="Grupo 52">
+            <a:extLst>
+              <a:ext uri="{FF2B5EF4-FFF2-40B4-BE49-F238E27FC236}">
+                <a16:creationId xmlns:a16="http://schemas.microsoft.com/office/drawing/2014/main" id="{C0E01DEF-8F18-434F-AFB0-03C964ED7B8C}"/>
+              </a:ext>
+            </a:extLst>
+          </p:cNvPr>
+          <p:cNvGrpSpPr/>
+          <p:nvPr/>
+        </p:nvGrpSpPr>
+        <p:grpSpPr>
+          <a:xfrm>
+            <a:off x="797498" y="616043"/>
+            <a:ext cx="1730042" cy="1523553"/>
+            <a:chOff x="797498" y="616043"/>
+            <a:chExt cx="1730042" cy="1523553"/>
+          </a:xfrm>
+        </p:grpSpPr>
+        <p:pic>
+          <p:nvPicPr>
+            <p:cNvPr id="1026" name="Picture 2" descr="https://www.veris.com.ec/wp-content/themes/mdigital_veris/images/footer/deberes/atencion-digna.png">
+              <a:extLst>
+                <a:ext uri="{FF2B5EF4-FFF2-40B4-BE49-F238E27FC236}">
+                  <a16:creationId xmlns:a16="http://schemas.microsoft.com/office/drawing/2014/main" id="{392C8D33-589C-4D74-93A2-B930806C67AD}"/>
+                </a:ext>
+              </a:extLst>
+            </p:cNvPr>
+            <p:cNvPicPr>
+              <a:picLocks noChangeAspect="1" noChangeArrowheads="1"/>
+            </p:cNvPicPr>
+            <p:nvPr/>
+          </p:nvPicPr>
+          <p:blipFill>
+            <a:blip r:embed="rId2">
+              <a:extLst>
+                <a:ext uri="{28A0092B-C50C-407E-A947-70E740481C1C}">
+                  <a14:useLocalDpi xmlns:a14="http://schemas.microsoft.com/office/drawing/2010/main" val="0"/>
+                </a:ext>
+              </a:extLst>
+            </a:blip>
+            <a:srcRect/>
+            <a:stretch>
+              <a:fillRect/>
+            </a:stretch>
+          </p:blipFill>
+          <p:spPr bwMode="auto">
+            <a:xfrm>
+              <a:off x="797498" y="616043"/>
+              <a:ext cx="1582982" cy="1523553"/>
+            </a:xfrm>
+            <a:prstGeom prst="rect">
+              <a:avLst/>
+            </a:prstGeom>
+            <a:noFill/>
+            <a:extLst>
+              <a:ext uri="{909E8E84-426E-40DD-AFC4-6F175D3DCCD1}">
+                <a14:hiddenFill xmlns:a14="http://schemas.microsoft.com/office/drawing/2010/main">
+                  <a:solidFill>
+                    <a:srgbClr val="FFFFFF"/>
+                  </a:solidFill>
+                </a14:hiddenFill>
+              </a:ext>
+            </a:extLst>
+          </p:spPr>
+        </p:pic>
+        <p:pic>
+          <p:nvPicPr>
+            <p:cNvPr id="74" name="Gráfico 73" descr="Medicina">
+              <a:extLst>
+                <a:ext uri="{FF2B5EF4-FFF2-40B4-BE49-F238E27FC236}">
+                  <a16:creationId xmlns:a16="http://schemas.microsoft.com/office/drawing/2014/main" id="{7863F0E5-9CC2-4267-B638-9A81B84440A7}"/>
+                </a:ext>
+              </a:extLst>
+            </p:cNvPr>
+            <p:cNvPicPr>
+              <a:picLocks noChangeAspect="1"/>
+            </p:cNvPicPr>
+            <p:nvPr/>
+          </p:nvPicPr>
+          <p:blipFill>
+            <a:blip r:embed="rId3">
+              <a:extLst>
+                <a:ext uri="{28A0092B-C50C-407E-A947-70E740481C1C}">
+                  <a14:useLocalDpi xmlns:a14="http://schemas.microsoft.com/office/drawing/2010/main" val="0"/>
+                </a:ext>
+                <a:ext uri="{96DAC541-7B7A-43D3-8B79-37D633B846F1}">
+                  <asvg:svgBlip xmlns:asvg="http://schemas.microsoft.com/office/drawing/2016/SVG/main" r:embed="rId4"/>
+                </a:ext>
+              </a:extLst>
+            </a:blip>
+            <a:stretch>
+              <a:fillRect/>
+            </a:stretch>
+          </p:blipFill>
+          <p:spPr>
+            <a:xfrm>
+              <a:off x="2017055" y="1384084"/>
+              <a:ext cx="510485" cy="510485"/>
+            </a:xfrm>
+            <a:prstGeom prst="rect">
+              <a:avLst/>
+            </a:prstGeom>
+          </p:spPr>
+        </p:pic>
+      </p:grpSp>
+      <p:grpSp>
+        <p:nvGrpSpPr>
+          <p:cNvPr id="104" name="Grupo 103">
+            <a:extLst>
+              <a:ext uri="{FF2B5EF4-FFF2-40B4-BE49-F238E27FC236}">
+                <a16:creationId xmlns:a16="http://schemas.microsoft.com/office/drawing/2014/main" id="{361D73AF-79C1-4EF3-8BFB-F8CB170FF663}"/>
+              </a:ext>
+            </a:extLst>
+          </p:cNvPr>
+          <p:cNvGrpSpPr/>
+          <p:nvPr/>
+        </p:nvGrpSpPr>
+        <p:grpSpPr>
+          <a:xfrm>
+            <a:off x="1131789" y="2400281"/>
+            <a:ext cx="1395751" cy="914400"/>
+            <a:chOff x="1131789" y="2400281"/>
+            <a:chExt cx="1395751" cy="914400"/>
+          </a:xfrm>
+        </p:grpSpPr>
+        <p:pic>
+          <p:nvPicPr>
+            <p:cNvPr id="51" name="Gráfico 50" descr="Usuarios">
+              <a:extLst>
+                <a:ext uri="{FF2B5EF4-FFF2-40B4-BE49-F238E27FC236}">
+                  <a16:creationId xmlns:a16="http://schemas.microsoft.com/office/drawing/2014/main" id="{05CC0E1F-9D4A-4EB7-AD9B-2EA1C32C62AD}"/>
+                </a:ext>
+              </a:extLst>
+            </p:cNvPr>
+            <p:cNvPicPr>
+              <a:picLocks noChangeAspect="1"/>
+            </p:cNvPicPr>
+            <p:nvPr/>
+          </p:nvPicPr>
+          <p:blipFill>
+            <a:blip r:embed="rId5">
+              <a:extLst>
+                <a:ext uri="{28A0092B-C50C-407E-A947-70E740481C1C}">
+                  <a14:useLocalDpi xmlns:a14="http://schemas.microsoft.com/office/drawing/2010/main" val="0"/>
+                </a:ext>
+                <a:ext uri="{96DAC541-7B7A-43D3-8B79-37D633B846F1}">
+                  <asvg:svgBlip xmlns:asvg="http://schemas.microsoft.com/office/drawing/2016/SVG/main" r:embed="rId6"/>
+                </a:ext>
+              </a:extLst>
+            </a:blip>
+            <a:stretch>
+              <a:fillRect/>
+            </a:stretch>
+          </p:blipFill>
+          <p:spPr>
+            <a:xfrm>
+              <a:off x="1131789" y="2400281"/>
+              <a:ext cx="914400" cy="914400"/>
+            </a:xfrm>
+            <a:prstGeom prst="rect">
+              <a:avLst/>
+            </a:prstGeom>
+          </p:spPr>
+        </p:pic>
+        <p:pic>
+          <p:nvPicPr>
+            <p:cNvPr id="87" name="Gráfico 86" descr="Medicina">
+              <a:extLst>
+                <a:ext uri="{FF2B5EF4-FFF2-40B4-BE49-F238E27FC236}">
+                  <a16:creationId xmlns:a16="http://schemas.microsoft.com/office/drawing/2014/main" id="{D522135E-3929-4F7B-BF5E-0FD833DAE094}"/>
+                </a:ext>
+              </a:extLst>
+            </p:cNvPr>
+            <p:cNvPicPr>
+              <a:picLocks noChangeAspect="1"/>
+            </p:cNvPicPr>
+            <p:nvPr/>
+          </p:nvPicPr>
+          <p:blipFill>
+            <a:blip r:embed="rId3">
+              <a:extLst>
+                <a:ext uri="{28A0092B-C50C-407E-A947-70E740481C1C}">
+                  <a14:useLocalDpi xmlns:a14="http://schemas.microsoft.com/office/drawing/2010/main" val="0"/>
+                </a:ext>
+                <a:ext uri="{96DAC541-7B7A-43D3-8B79-37D633B846F1}">
+                  <asvg:svgBlip xmlns:asvg="http://schemas.microsoft.com/office/drawing/2016/SVG/main" r:embed="rId4"/>
+                </a:ext>
+              </a:extLst>
+            </a:blip>
+            <a:stretch>
+              <a:fillRect/>
+            </a:stretch>
+          </p:blipFill>
+          <p:spPr>
+            <a:xfrm>
+              <a:off x="2017055" y="2652394"/>
+              <a:ext cx="510485" cy="510485"/>
+            </a:xfrm>
+            <a:prstGeom prst="rect">
+              <a:avLst/>
+            </a:prstGeom>
+          </p:spPr>
+        </p:pic>
+      </p:grpSp>
+      <p:grpSp>
+        <p:nvGrpSpPr>
+          <p:cNvPr id="105" name="Grupo 104">
+            <a:extLst>
+              <a:ext uri="{FF2B5EF4-FFF2-40B4-BE49-F238E27FC236}">
+                <a16:creationId xmlns:a16="http://schemas.microsoft.com/office/drawing/2014/main" id="{7F00D385-2B45-47FC-AEBA-69B993D0FB52}"/>
+              </a:ext>
+            </a:extLst>
+          </p:cNvPr>
+          <p:cNvGrpSpPr/>
+          <p:nvPr/>
+        </p:nvGrpSpPr>
+        <p:grpSpPr>
+          <a:xfrm>
+            <a:off x="1131789" y="3815621"/>
+            <a:ext cx="1256927" cy="914400"/>
+            <a:chOff x="1131789" y="3815621"/>
+            <a:chExt cx="1256927" cy="914400"/>
+          </a:xfrm>
+        </p:grpSpPr>
+        <p:pic>
+          <p:nvPicPr>
+            <p:cNvPr id="14" name="Gráfico 13" descr="Medicina">
+              <a:extLst>
+                <a:ext uri="{FF2B5EF4-FFF2-40B4-BE49-F238E27FC236}">
+                  <a16:creationId xmlns:a16="http://schemas.microsoft.com/office/drawing/2014/main" id="{C3FD46B6-E86C-4FB9-B6E1-EFC61187DC88}"/>
+                </a:ext>
+              </a:extLst>
+            </p:cNvPr>
+            <p:cNvPicPr>
+              <a:picLocks noChangeAspect="1"/>
+            </p:cNvPicPr>
+            <p:nvPr/>
+          </p:nvPicPr>
+          <p:blipFill>
+            <a:blip r:embed="rId7">
+              <a:extLst>
+                <a:ext uri="{28A0092B-C50C-407E-A947-70E740481C1C}">
+                  <a14:useLocalDpi xmlns:a14="http://schemas.microsoft.com/office/drawing/2010/main" val="0"/>
+                </a:ext>
+                <a:ext uri="{96DAC541-7B7A-43D3-8B79-37D633B846F1}">
+                  <asvg:svgBlip xmlns:asvg="http://schemas.microsoft.com/office/drawing/2016/SVG/main" r:embed="rId8"/>
+                </a:ext>
+              </a:extLst>
+            </a:blip>
+            <a:stretch>
+              <a:fillRect/>
+            </a:stretch>
+          </p:blipFill>
+          <p:spPr>
+            <a:xfrm>
+              <a:off x="1131789" y="3815621"/>
+              <a:ext cx="914400" cy="914400"/>
+            </a:xfrm>
+            <a:prstGeom prst="rect">
+              <a:avLst/>
+            </a:prstGeom>
+          </p:spPr>
+        </p:pic>
+        <p:pic>
+          <p:nvPicPr>
+            <p:cNvPr id="88" name="Gráfico 87" descr="Medicina">
+              <a:extLst>
+                <a:ext uri="{FF2B5EF4-FFF2-40B4-BE49-F238E27FC236}">
+                  <a16:creationId xmlns:a16="http://schemas.microsoft.com/office/drawing/2014/main" id="{321E9AA2-C1AA-42AE-B73F-5EBDB8005E46}"/>
+                </a:ext>
+              </a:extLst>
+            </p:cNvPr>
+            <p:cNvPicPr>
+              <a:picLocks noChangeAspect="1"/>
+            </p:cNvPicPr>
+            <p:nvPr/>
+          </p:nvPicPr>
+          <p:blipFill>
+            <a:blip r:embed="rId3">
+              <a:extLst>
+                <a:ext uri="{28A0092B-C50C-407E-A947-70E740481C1C}">
+                  <a14:useLocalDpi xmlns:a14="http://schemas.microsoft.com/office/drawing/2010/main" val="0"/>
+                </a:ext>
+                <a:ext uri="{96DAC541-7B7A-43D3-8B79-37D633B846F1}">
+                  <asvg:svgBlip xmlns:asvg="http://schemas.microsoft.com/office/drawing/2016/SVG/main" r:embed="rId4"/>
+                </a:ext>
+              </a:extLst>
+            </a:blip>
+            <a:stretch>
+              <a:fillRect/>
+            </a:stretch>
+          </p:blipFill>
+          <p:spPr>
+            <a:xfrm>
+              <a:off x="1878231" y="4204366"/>
+              <a:ext cx="510485" cy="510485"/>
+            </a:xfrm>
+            <a:prstGeom prst="rect">
+              <a:avLst/>
+            </a:prstGeom>
+          </p:spPr>
+        </p:pic>
+      </p:grpSp>
+      <p:grpSp>
+        <p:nvGrpSpPr>
+          <p:cNvPr id="112" name="Grupo 111">
+            <a:extLst>
+              <a:ext uri="{FF2B5EF4-FFF2-40B4-BE49-F238E27FC236}">
+                <a16:creationId xmlns:a16="http://schemas.microsoft.com/office/drawing/2014/main" id="{F9C2161A-8FC3-4D3A-95A9-E4306D107C68}"/>
+              </a:ext>
+            </a:extLst>
+          </p:cNvPr>
+          <p:cNvGrpSpPr/>
+          <p:nvPr/>
+        </p:nvGrpSpPr>
+        <p:grpSpPr>
+          <a:xfrm>
+            <a:off x="1131789" y="5218635"/>
+            <a:ext cx="1222018" cy="947155"/>
+            <a:chOff x="1131789" y="5218635"/>
+            <a:chExt cx="1222018" cy="947155"/>
+          </a:xfrm>
+        </p:grpSpPr>
+        <p:pic>
+          <p:nvPicPr>
+            <p:cNvPr id="7" name="Gráfico 6" descr="Ciclismo">
+              <a:extLst>
+                <a:ext uri="{FF2B5EF4-FFF2-40B4-BE49-F238E27FC236}">
+                  <a16:creationId xmlns:a16="http://schemas.microsoft.com/office/drawing/2014/main" id="{F3A6A68B-3F49-4A15-9064-A6D144756916}"/>
+                </a:ext>
+              </a:extLst>
+            </p:cNvPr>
+            <p:cNvPicPr>
+              <a:picLocks noChangeAspect="1"/>
+            </p:cNvPicPr>
+            <p:nvPr/>
+          </p:nvPicPr>
+          <p:blipFill>
+            <a:blip r:embed="rId9">
+              <a:extLst>
+                <a:ext uri="{28A0092B-C50C-407E-A947-70E740481C1C}">
+                  <a14:useLocalDpi xmlns:a14="http://schemas.microsoft.com/office/drawing/2010/main" val="0"/>
+                </a:ext>
+                <a:ext uri="{96DAC541-7B7A-43D3-8B79-37D633B846F1}">
+                  <asvg:svgBlip xmlns:asvg="http://schemas.microsoft.com/office/drawing/2016/SVG/main" r:embed="rId10"/>
+                </a:ext>
+              </a:extLst>
+            </a:blip>
+            <a:stretch>
+              <a:fillRect/>
+            </a:stretch>
+          </p:blipFill>
+          <p:spPr>
+            <a:xfrm>
+              <a:off x="1131789" y="5251390"/>
+              <a:ext cx="914400" cy="914400"/>
+            </a:xfrm>
+            <a:prstGeom prst="rect">
+              <a:avLst/>
+            </a:prstGeom>
+          </p:spPr>
+        </p:pic>
+        <p:pic>
+          <p:nvPicPr>
+            <p:cNvPr id="89" name="Gráfico 88" descr="Medicina">
+              <a:extLst>
+                <a:ext uri="{FF2B5EF4-FFF2-40B4-BE49-F238E27FC236}">
+                  <a16:creationId xmlns:a16="http://schemas.microsoft.com/office/drawing/2014/main" id="{E642845D-FE62-46FE-B089-2C0D84DFA440}"/>
+                </a:ext>
+              </a:extLst>
+            </p:cNvPr>
+            <p:cNvPicPr>
+              <a:picLocks noChangeAspect="1"/>
+            </p:cNvPicPr>
+            <p:nvPr/>
+          </p:nvPicPr>
+          <p:blipFill>
+            <a:blip r:embed="rId3">
+              <a:extLst>
+                <a:ext uri="{28A0092B-C50C-407E-A947-70E740481C1C}">
+                  <a14:useLocalDpi xmlns:a14="http://schemas.microsoft.com/office/drawing/2010/main" val="0"/>
+                </a:ext>
+                <a:ext uri="{96DAC541-7B7A-43D3-8B79-37D633B846F1}">
+                  <asvg:svgBlip xmlns:asvg="http://schemas.microsoft.com/office/drawing/2016/SVG/main" r:embed="rId4"/>
+                </a:ext>
+              </a:extLst>
+            </a:blip>
+            <a:stretch>
+              <a:fillRect/>
+            </a:stretch>
+          </p:blipFill>
+          <p:spPr>
+            <a:xfrm>
+              <a:off x="1843322" y="5218635"/>
+              <a:ext cx="510485" cy="510485"/>
+            </a:xfrm>
+            <a:prstGeom prst="rect">
+              <a:avLst/>
+            </a:prstGeom>
+          </p:spPr>
+        </p:pic>
+      </p:grpSp>
+      <p:grpSp>
+        <p:nvGrpSpPr>
+          <p:cNvPr id="54" name="Grupo 53">
+            <a:extLst>
+              <a:ext uri="{FF2B5EF4-FFF2-40B4-BE49-F238E27FC236}">
+                <a16:creationId xmlns:a16="http://schemas.microsoft.com/office/drawing/2014/main" id="{DCC6EBB8-4548-40EC-A43B-5A43FD56F935}"/>
+              </a:ext>
+            </a:extLst>
+          </p:cNvPr>
+          <p:cNvGrpSpPr/>
+          <p:nvPr/>
+        </p:nvGrpSpPr>
+        <p:grpSpPr>
+          <a:xfrm>
+            <a:off x="2916728" y="616042"/>
+            <a:ext cx="1683931" cy="1523553"/>
+            <a:chOff x="2916728" y="616042"/>
+            <a:chExt cx="1683931" cy="1523553"/>
+          </a:xfrm>
+        </p:grpSpPr>
+        <p:pic>
+          <p:nvPicPr>
+            <p:cNvPr id="78" name="Picture 2" descr="https://www.veris.com.ec/wp-content/themes/mdigital_veris/images/footer/deberes/atencion-digna.png">
+              <a:extLst>
+                <a:ext uri="{FF2B5EF4-FFF2-40B4-BE49-F238E27FC236}">
+                  <a16:creationId xmlns:a16="http://schemas.microsoft.com/office/drawing/2014/main" id="{A69CE88C-318A-4754-AB42-B48642C66A5B}"/>
+                </a:ext>
+              </a:extLst>
+            </p:cNvPr>
+            <p:cNvPicPr>
+              <a:picLocks noChangeAspect="1" noChangeArrowheads="1"/>
+            </p:cNvPicPr>
+            <p:nvPr/>
+          </p:nvPicPr>
+          <p:blipFill>
+            <a:blip r:embed="rId2">
+              <a:extLst>
+                <a:ext uri="{28A0092B-C50C-407E-A947-70E740481C1C}">
+                  <a14:useLocalDpi xmlns:a14="http://schemas.microsoft.com/office/drawing/2010/main" val="0"/>
+                </a:ext>
+              </a:extLst>
+            </a:blip>
+            <a:srcRect/>
+            <a:stretch>
+              <a:fillRect/>
+            </a:stretch>
+          </p:blipFill>
+          <p:spPr bwMode="auto">
+            <a:xfrm>
+              <a:off x="2916728" y="616042"/>
+              <a:ext cx="1582982" cy="1523553"/>
+            </a:xfrm>
+            <a:prstGeom prst="rect">
+              <a:avLst/>
+            </a:prstGeom>
+            <a:noFill/>
+            <a:extLst>
+              <a:ext uri="{909E8E84-426E-40DD-AFC4-6F175D3DCCD1}">
+                <a14:hiddenFill xmlns:a14="http://schemas.microsoft.com/office/drawing/2010/main">
+                  <a:solidFill>
+                    <a:srgbClr val="FFFFFF"/>
+                  </a:solidFill>
+                </a14:hiddenFill>
+              </a:ext>
+            </a:extLst>
+          </p:spPr>
+        </p:pic>
+        <p:pic>
+          <p:nvPicPr>
+            <p:cNvPr id="90" name="Gráfico 89" descr="Herramientas de minería">
+              <a:extLst>
+                <a:ext uri="{FF2B5EF4-FFF2-40B4-BE49-F238E27FC236}">
+                  <a16:creationId xmlns:a16="http://schemas.microsoft.com/office/drawing/2014/main" id="{0BD19BCA-36A8-4643-9996-F0FBD8FA6539}"/>
+                </a:ext>
+              </a:extLst>
+            </p:cNvPr>
+            <p:cNvPicPr>
+              <a:picLocks noChangeAspect="1"/>
+            </p:cNvPicPr>
+            <p:nvPr/>
+          </p:nvPicPr>
+          <p:blipFill>
+            <a:blip r:embed="rId11">
+              <a:extLst>
+                <a:ext uri="{28A0092B-C50C-407E-A947-70E740481C1C}">
+                  <a14:useLocalDpi xmlns:a14="http://schemas.microsoft.com/office/drawing/2010/main" val="0"/>
+                </a:ext>
+                <a:ext uri="{96DAC541-7B7A-43D3-8B79-37D633B846F1}">
+                  <asvg:svgBlip xmlns:asvg="http://schemas.microsoft.com/office/drawing/2016/SVG/main" r:embed="rId12"/>
+                </a:ext>
+              </a:extLst>
+            </a:blip>
+            <a:stretch>
+              <a:fillRect/>
+            </a:stretch>
+          </p:blipFill>
+          <p:spPr>
+            <a:xfrm>
+              <a:off x="4138129" y="1377818"/>
+              <a:ext cx="462530" cy="462530"/>
+            </a:xfrm>
+            <a:prstGeom prst="rect">
+              <a:avLst/>
+            </a:prstGeom>
+          </p:spPr>
+        </p:pic>
+      </p:grpSp>
+      <p:grpSp>
+        <p:nvGrpSpPr>
+          <p:cNvPr id="103" name="Grupo 102">
+            <a:extLst>
+              <a:ext uri="{FF2B5EF4-FFF2-40B4-BE49-F238E27FC236}">
+                <a16:creationId xmlns:a16="http://schemas.microsoft.com/office/drawing/2014/main" id="{BD9D49DF-0D6B-4EEC-8B9B-BC5F852F103F}"/>
+              </a:ext>
+            </a:extLst>
+          </p:cNvPr>
+          <p:cNvGrpSpPr/>
+          <p:nvPr/>
+        </p:nvGrpSpPr>
+        <p:grpSpPr>
+          <a:xfrm>
+            <a:off x="3251019" y="2400280"/>
+            <a:ext cx="1349640" cy="914400"/>
+            <a:chOff x="3251019" y="2400280"/>
+            <a:chExt cx="1349640" cy="914400"/>
+          </a:xfrm>
+        </p:grpSpPr>
+        <p:pic>
+          <p:nvPicPr>
+            <p:cNvPr id="77" name="Gráfico 76" descr="Usuarios">
+              <a:extLst>
+                <a:ext uri="{FF2B5EF4-FFF2-40B4-BE49-F238E27FC236}">
+                  <a16:creationId xmlns:a16="http://schemas.microsoft.com/office/drawing/2014/main" id="{244470A4-B81D-4E98-9850-4238C553297C}"/>
+                </a:ext>
+              </a:extLst>
+            </p:cNvPr>
+            <p:cNvPicPr>
+              <a:picLocks noChangeAspect="1"/>
+            </p:cNvPicPr>
+            <p:nvPr/>
+          </p:nvPicPr>
+          <p:blipFill>
+            <a:blip r:embed="rId5">
+              <a:extLst>
+                <a:ext uri="{28A0092B-C50C-407E-A947-70E740481C1C}">
+                  <a14:useLocalDpi xmlns:a14="http://schemas.microsoft.com/office/drawing/2010/main" val="0"/>
+                </a:ext>
+                <a:ext uri="{96DAC541-7B7A-43D3-8B79-37D633B846F1}">
+                  <asvg:svgBlip xmlns:asvg="http://schemas.microsoft.com/office/drawing/2016/SVG/main" r:embed="rId6"/>
+                </a:ext>
+              </a:extLst>
+            </a:blip>
+            <a:stretch>
+              <a:fillRect/>
+            </a:stretch>
+          </p:blipFill>
+          <p:spPr>
+            <a:xfrm>
+              <a:off x="3251019" y="2400280"/>
+              <a:ext cx="914400" cy="914400"/>
+            </a:xfrm>
+            <a:prstGeom prst="rect">
+              <a:avLst/>
+            </a:prstGeom>
+          </p:spPr>
+        </p:pic>
+        <p:pic>
+          <p:nvPicPr>
+            <p:cNvPr id="91" name="Gráfico 90" descr="Herramientas de minería">
+              <a:extLst>
+                <a:ext uri="{FF2B5EF4-FFF2-40B4-BE49-F238E27FC236}">
+                  <a16:creationId xmlns:a16="http://schemas.microsoft.com/office/drawing/2014/main" id="{7F7C266B-913C-4CF7-A282-E099FE8A4682}"/>
+                </a:ext>
+              </a:extLst>
+            </p:cNvPr>
+            <p:cNvPicPr>
+              <a:picLocks noChangeAspect="1"/>
+            </p:cNvPicPr>
+            <p:nvPr/>
+          </p:nvPicPr>
+          <p:blipFill>
+            <a:blip r:embed="rId11">
+              <a:extLst>
+                <a:ext uri="{28A0092B-C50C-407E-A947-70E740481C1C}">
+                  <a14:useLocalDpi xmlns:a14="http://schemas.microsoft.com/office/drawing/2010/main" val="0"/>
+                </a:ext>
+                <a:ext uri="{96DAC541-7B7A-43D3-8B79-37D633B846F1}">
+                  <asvg:svgBlip xmlns:asvg="http://schemas.microsoft.com/office/drawing/2016/SVG/main" r:embed="rId12"/>
+                </a:ext>
+              </a:extLst>
+            </a:blip>
+            <a:stretch>
+              <a:fillRect/>
+            </a:stretch>
+          </p:blipFill>
+          <p:spPr>
+            <a:xfrm>
+              <a:off x="4138129" y="2687921"/>
+              <a:ext cx="462530" cy="462530"/>
+            </a:xfrm>
+            <a:prstGeom prst="rect">
+              <a:avLst/>
+            </a:prstGeom>
+          </p:spPr>
+        </p:pic>
+      </p:grpSp>
+      <p:grpSp>
+        <p:nvGrpSpPr>
+          <p:cNvPr id="106" name="Grupo 105">
+            <a:extLst>
+              <a:ext uri="{FF2B5EF4-FFF2-40B4-BE49-F238E27FC236}">
+                <a16:creationId xmlns:a16="http://schemas.microsoft.com/office/drawing/2014/main" id="{93260AC7-0D3E-4D91-AEC4-7BDAB0B1A909}"/>
+              </a:ext>
+            </a:extLst>
+          </p:cNvPr>
+          <p:cNvGrpSpPr/>
+          <p:nvPr/>
+        </p:nvGrpSpPr>
+        <p:grpSpPr>
+          <a:xfrm>
+            <a:off x="3251019" y="3815620"/>
+            <a:ext cx="1245996" cy="914400"/>
+            <a:chOff x="3251019" y="3815620"/>
+            <a:chExt cx="1245996" cy="914400"/>
+          </a:xfrm>
+        </p:grpSpPr>
+        <p:pic>
+          <p:nvPicPr>
+            <p:cNvPr id="76" name="Gráfico 75" descr="Medicina">
+              <a:extLst>
+                <a:ext uri="{FF2B5EF4-FFF2-40B4-BE49-F238E27FC236}">
+                  <a16:creationId xmlns:a16="http://schemas.microsoft.com/office/drawing/2014/main" id="{C26A9627-469A-4773-B12F-F8DF01296728}"/>
+                </a:ext>
+              </a:extLst>
+            </p:cNvPr>
+            <p:cNvPicPr>
+              <a:picLocks noChangeAspect="1"/>
+            </p:cNvPicPr>
+            <p:nvPr/>
+          </p:nvPicPr>
+          <p:blipFill>
+            <a:blip r:embed="rId7">
+              <a:extLst>
+                <a:ext uri="{28A0092B-C50C-407E-A947-70E740481C1C}">
+                  <a14:useLocalDpi xmlns:a14="http://schemas.microsoft.com/office/drawing/2010/main" val="0"/>
+                </a:ext>
+                <a:ext uri="{96DAC541-7B7A-43D3-8B79-37D633B846F1}">
+                  <asvg:svgBlip xmlns:asvg="http://schemas.microsoft.com/office/drawing/2016/SVG/main" r:embed="rId8"/>
+                </a:ext>
+              </a:extLst>
+            </a:blip>
+            <a:stretch>
+              <a:fillRect/>
+            </a:stretch>
+          </p:blipFill>
+          <p:spPr>
+            <a:xfrm>
+              <a:off x="3251019" y="3815620"/>
+              <a:ext cx="914400" cy="914400"/>
+            </a:xfrm>
+            <a:prstGeom prst="rect">
+              <a:avLst/>
+            </a:prstGeom>
+          </p:spPr>
+        </p:pic>
+        <p:pic>
+          <p:nvPicPr>
+            <p:cNvPr id="92" name="Gráfico 91" descr="Herramientas de minería">
+              <a:extLst>
+                <a:ext uri="{FF2B5EF4-FFF2-40B4-BE49-F238E27FC236}">
+                  <a16:creationId xmlns:a16="http://schemas.microsoft.com/office/drawing/2014/main" id="{D7C5A368-EB16-4FD3-A69E-9A5BC2878BAF}"/>
+                </a:ext>
+              </a:extLst>
+            </p:cNvPr>
+            <p:cNvPicPr>
+              <a:picLocks noChangeAspect="1"/>
+            </p:cNvPicPr>
+            <p:nvPr/>
+          </p:nvPicPr>
+          <p:blipFill>
+            <a:blip r:embed="rId11">
+              <a:extLst>
+                <a:ext uri="{28A0092B-C50C-407E-A947-70E740481C1C}">
+                  <a14:useLocalDpi xmlns:a14="http://schemas.microsoft.com/office/drawing/2010/main" val="0"/>
+                </a:ext>
+                <a:ext uri="{96DAC541-7B7A-43D3-8B79-37D633B846F1}">
+                  <asvg:svgBlip xmlns:asvg="http://schemas.microsoft.com/office/drawing/2016/SVG/main" r:embed="rId12"/>
+                </a:ext>
+              </a:extLst>
+            </a:blip>
+            <a:stretch>
+              <a:fillRect/>
+            </a:stretch>
+          </p:blipFill>
+          <p:spPr>
+            <a:xfrm>
+              <a:off x="4034485" y="4204366"/>
+              <a:ext cx="462530" cy="462530"/>
+            </a:xfrm>
+            <a:prstGeom prst="rect">
+              <a:avLst/>
+            </a:prstGeom>
+          </p:spPr>
+        </p:pic>
+      </p:grpSp>
+      <p:grpSp>
+        <p:nvGrpSpPr>
+          <p:cNvPr id="111" name="Grupo 110">
+            <a:extLst>
+              <a:ext uri="{FF2B5EF4-FFF2-40B4-BE49-F238E27FC236}">
+                <a16:creationId xmlns:a16="http://schemas.microsoft.com/office/drawing/2014/main" id="{D078F51C-3417-47C1-A9F2-955031F9308A}"/>
+              </a:ext>
+            </a:extLst>
+          </p:cNvPr>
+          <p:cNvGrpSpPr/>
+          <p:nvPr/>
+        </p:nvGrpSpPr>
+        <p:grpSpPr>
+          <a:xfrm>
+            <a:off x="3251019" y="5246059"/>
+            <a:ext cx="1245996" cy="919730"/>
+            <a:chOff x="3251019" y="5246059"/>
+            <a:chExt cx="1245996" cy="919730"/>
+          </a:xfrm>
+        </p:grpSpPr>
+        <p:pic>
+          <p:nvPicPr>
+            <p:cNvPr id="75" name="Gráfico 74" descr="Ciclismo">
+              <a:extLst>
+                <a:ext uri="{FF2B5EF4-FFF2-40B4-BE49-F238E27FC236}">
+                  <a16:creationId xmlns:a16="http://schemas.microsoft.com/office/drawing/2014/main" id="{244A1F55-0373-4F96-839C-80213D05D940}"/>
+                </a:ext>
+              </a:extLst>
+            </p:cNvPr>
+            <p:cNvPicPr>
+              <a:picLocks noChangeAspect="1"/>
+            </p:cNvPicPr>
+            <p:nvPr/>
+          </p:nvPicPr>
+          <p:blipFill>
+            <a:blip r:embed="rId9">
+              <a:extLst>
+                <a:ext uri="{28A0092B-C50C-407E-A947-70E740481C1C}">
+                  <a14:useLocalDpi xmlns:a14="http://schemas.microsoft.com/office/drawing/2010/main" val="0"/>
+                </a:ext>
+                <a:ext uri="{96DAC541-7B7A-43D3-8B79-37D633B846F1}">
+                  <asvg:svgBlip xmlns:asvg="http://schemas.microsoft.com/office/drawing/2016/SVG/main" r:embed="rId10"/>
+                </a:ext>
+              </a:extLst>
+            </a:blip>
+            <a:stretch>
+              <a:fillRect/>
+            </a:stretch>
+          </p:blipFill>
+          <p:spPr>
+            <a:xfrm>
+              <a:off x="3251019" y="5251389"/>
+              <a:ext cx="914400" cy="914400"/>
+            </a:xfrm>
+            <a:prstGeom prst="rect">
+              <a:avLst/>
+            </a:prstGeom>
+          </p:spPr>
+        </p:pic>
+        <p:pic>
+          <p:nvPicPr>
+            <p:cNvPr id="93" name="Gráfico 92" descr="Herramientas de minería">
+              <a:extLst>
+                <a:ext uri="{FF2B5EF4-FFF2-40B4-BE49-F238E27FC236}">
+                  <a16:creationId xmlns:a16="http://schemas.microsoft.com/office/drawing/2014/main" id="{36E2E7AA-6A4D-45C9-B5B5-92E35C1D30C8}"/>
+                </a:ext>
+              </a:extLst>
+            </p:cNvPr>
+            <p:cNvPicPr>
+              <a:picLocks noChangeAspect="1"/>
+            </p:cNvPicPr>
+            <p:nvPr/>
+          </p:nvPicPr>
+          <p:blipFill>
+            <a:blip r:embed="rId11">
+              <a:extLst>
+                <a:ext uri="{28A0092B-C50C-407E-A947-70E740481C1C}">
+                  <a14:useLocalDpi xmlns:a14="http://schemas.microsoft.com/office/drawing/2010/main" val="0"/>
+                </a:ext>
+                <a:ext uri="{96DAC541-7B7A-43D3-8B79-37D633B846F1}">
+                  <asvg:svgBlip xmlns:asvg="http://schemas.microsoft.com/office/drawing/2016/SVG/main" r:embed="rId12"/>
+                </a:ext>
+              </a:extLst>
+            </a:blip>
+            <a:stretch>
+              <a:fillRect/>
+            </a:stretch>
+          </p:blipFill>
+          <p:spPr>
+            <a:xfrm>
+              <a:off x="4034485" y="5246059"/>
+              <a:ext cx="462530" cy="462530"/>
+            </a:xfrm>
+            <a:prstGeom prst="rect">
+              <a:avLst/>
+            </a:prstGeom>
+          </p:spPr>
+        </p:pic>
+      </p:grpSp>
+      <p:grpSp>
+        <p:nvGrpSpPr>
+          <p:cNvPr id="56" name="Grupo 55">
+            <a:extLst>
+              <a:ext uri="{FF2B5EF4-FFF2-40B4-BE49-F238E27FC236}">
+                <a16:creationId xmlns:a16="http://schemas.microsoft.com/office/drawing/2014/main" id="{78804333-33D3-4C6F-89E8-0D456668DA3F}"/>
+              </a:ext>
+            </a:extLst>
+          </p:cNvPr>
+          <p:cNvGrpSpPr/>
+          <p:nvPr/>
+        </p:nvGrpSpPr>
+        <p:grpSpPr>
+          <a:xfrm>
+            <a:off x="4780716" y="616042"/>
+            <a:ext cx="1607243" cy="1523553"/>
+            <a:chOff x="4780716" y="616042"/>
+            <a:chExt cx="1607243" cy="1523553"/>
+          </a:xfrm>
+        </p:grpSpPr>
+        <p:pic>
+          <p:nvPicPr>
+            <p:cNvPr id="82" name="Picture 2" descr="https://www.veris.com.ec/wp-content/themes/mdigital_veris/images/footer/deberes/atencion-digna.png">
+              <a:extLst>
+                <a:ext uri="{FF2B5EF4-FFF2-40B4-BE49-F238E27FC236}">
+                  <a16:creationId xmlns:a16="http://schemas.microsoft.com/office/drawing/2014/main" id="{911FE15C-D454-4F5A-86A3-79321621D8D1}"/>
+                </a:ext>
+              </a:extLst>
+            </p:cNvPr>
+            <p:cNvPicPr>
+              <a:picLocks noChangeAspect="1" noChangeArrowheads="1"/>
+            </p:cNvPicPr>
+            <p:nvPr/>
+          </p:nvPicPr>
+          <p:blipFill>
+            <a:blip r:embed="rId2">
+              <a:extLst>
+                <a:ext uri="{28A0092B-C50C-407E-A947-70E740481C1C}">
+                  <a14:useLocalDpi xmlns:a14="http://schemas.microsoft.com/office/drawing/2010/main" val="0"/>
+                </a:ext>
+              </a:extLst>
+            </a:blip>
+            <a:srcRect/>
+            <a:stretch>
+              <a:fillRect/>
+            </a:stretch>
+          </p:blipFill>
+          <p:spPr bwMode="auto">
+            <a:xfrm>
+              <a:off x="4780716" y="616042"/>
+              <a:ext cx="1582982" cy="1523553"/>
+            </a:xfrm>
+            <a:prstGeom prst="rect">
+              <a:avLst/>
+            </a:prstGeom>
+            <a:noFill/>
+            <a:extLst>
+              <a:ext uri="{909E8E84-426E-40DD-AFC4-6F175D3DCCD1}">
+                <a14:hiddenFill xmlns:a14="http://schemas.microsoft.com/office/drawing/2010/main">
+                  <a:solidFill>
+                    <a:srgbClr val="FFFFFF"/>
+                  </a:solidFill>
+                </a14:hiddenFill>
+              </a:ext>
+            </a:extLst>
+          </p:spPr>
+        </p:pic>
+        <p:pic>
+          <p:nvPicPr>
+            <p:cNvPr id="94" name="Gráfico 93" descr="Reciclaje">
+              <a:extLst>
+                <a:ext uri="{FF2B5EF4-FFF2-40B4-BE49-F238E27FC236}">
+                  <a16:creationId xmlns:a16="http://schemas.microsoft.com/office/drawing/2014/main" id="{8E7BBB83-0EF8-4B0D-9405-8FD71E58BC43}"/>
+                </a:ext>
+              </a:extLst>
+            </p:cNvPr>
+            <p:cNvPicPr>
+              <a:picLocks noChangeAspect="1"/>
+            </p:cNvPicPr>
+            <p:nvPr/>
+          </p:nvPicPr>
+          <p:blipFill>
+            <a:blip r:embed="rId13">
+              <a:extLst>
+                <a:ext uri="{28A0092B-C50C-407E-A947-70E740481C1C}">
+                  <a14:useLocalDpi xmlns:a14="http://schemas.microsoft.com/office/drawing/2010/main" val="0"/>
+                </a:ext>
+                <a:ext uri="{96DAC541-7B7A-43D3-8B79-37D633B846F1}">
+                  <asvg:svgBlip xmlns:asvg="http://schemas.microsoft.com/office/drawing/2016/SVG/main" r:embed="rId14"/>
+                </a:ext>
+              </a:extLst>
+            </a:blip>
+            <a:stretch>
+              <a:fillRect/>
+            </a:stretch>
+          </p:blipFill>
+          <p:spPr>
+            <a:xfrm>
+              <a:off x="5903129" y="1481149"/>
+              <a:ext cx="484830" cy="484830"/>
+            </a:xfrm>
+            <a:prstGeom prst="rect">
+              <a:avLst/>
+            </a:prstGeom>
+          </p:spPr>
+        </p:pic>
+      </p:grpSp>
+      <p:grpSp>
+        <p:nvGrpSpPr>
+          <p:cNvPr id="102" name="Grupo 101">
+            <a:extLst>
+              <a:ext uri="{FF2B5EF4-FFF2-40B4-BE49-F238E27FC236}">
+                <a16:creationId xmlns:a16="http://schemas.microsoft.com/office/drawing/2014/main" id="{CC0DF150-DFE2-4897-812A-2A97D84FB953}"/>
+              </a:ext>
+            </a:extLst>
+          </p:cNvPr>
+          <p:cNvGrpSpPr/>
+          <p:nvPr/>
+        </p:nvGrpSpPr>
+        <p:grpSpPr>
+          <a:xfrm>
+            <a:off x="5115007" y="2400280"/>
+            <a:ext cx="1272952" cy="914400"/>
+            <a:chOff x="5115007" y="2400280"/>
+            <a:chExt cx="1272952" cy="914400"/>
+          </a:xfrm>
+        </p:grpSpPr>
+        <p:pic>
+          <p:nvPicPr>
+            <p:cNvPr id="81" name="Gráfico 80" descr="Usuarios">
+              <a:extLst>
+                <a:ext uri="{FF2B5EF4-FFF2-40B4-BE49-F238E27FC236}">
+                  <a16:creationId xmlns:a16="http://schemas.microsoft.com/office/drawing/2014/main" id="{8C02B7C7-CC01-4C59-829B-67F266185B4D}"/>
+                </a:ext>
+              </a:extLst>
+            </p:cNvPr>
+            <p:cNvPicPr>
+              <a:picLocks noChangeAspect="1"/>
+            </p:cNvPicPr>
+            <p:nvPr/>
+          </p:nvPicPr>
+          <p:blipFill>
+            <a:blip r:embed="rId5">
+              <a:extLst>
+                <a:ext uri="{28A0092B-C50C-407E-A947-70E740481C1C}">
+                  <a14:useLocalDpi xmlns:a14="http://schemas.microsoft.com/office/drawing/2010/main" val="0"/>
+                </a:ext>
+                <a:ext uri="{96DAC541-7B7A-43D3-8B79-37D633B846F1}">
+                  <asvg:svgBlip xmlns:asvg="http://schemas.microsoft.com/office/drawing/2016/SVG/main" r:embed="rId6"/>
+                </a:ext>
+              </a:extLst>
+            </a:blip>
+            <a:stretch>
+              <a:fillRect/>
+            </a:stretch>
+          </p:blipFill>
+          <p:spPr>
+            <a:xfrm>
+              <a:off x="5115007" y="2400280"/>
+              <a:ext cx="914400" cy="914400"/>
+            </a:xfrm>
+            <a:prstGeom prst="rect">
+              <a:avLst/>
+            </a:prstGeom>
+          </p:spPr>
+        </p:pic>
+        <p:pic>
+          <p:nvPicPr>
+            <p:cNvPr id="95" name="Gráfico 94" descr="Reciclaje">
+              <a:extLst>
+                <a:ext uri="{FF2B5EF4-FFF2-40B4-BE49-F238E27FC236}">
+                  <a16:creationId xmlns:a16="http://schemas.microsoft.com/office/drawing/2014/main" id="{CA7646A9-35B5-46E8-8DEA-EA6C9C45F485}"/>
+                </a:ext>
+              </a:extLst>
+            </p:cNvPr>
+            <p:cNvPicPr>
+              <a:picLocks noChangeAspect="1"/>
+            </p:cNvPicPr>
+            <p:nvPr/>
+          </p:nvPicPr>
+          <p:blipFill>
+            <a:blip r:embed="rId13">
+              <a:extLst>
+                <a:ext uri="{28A0092B-C50C-407E-A947-70E740481C1C}">
+                  <a14:useLocalDpi xmlns:a14="http://schemas.microsoft.com/office/drawing/2010/main" val="0"/>
+                </a:ext>
+                <a:ext uri="{96DAC541-7B7A-43D3-8B79-37D633B846F1}">
+                  <asvg:svgBlip xmlns:asvg="http://schemas.microsoft.com/office/drawing/2016/SVG/main" r:embed="rId14"/>
+                </a:ext>
+              </a:extLst>
+            </a:blip>
+            <a:stretch>
+              <a:fillRect/>
+            </a:stretch>
+          </p:blipFill>
+          <p:spPr>
+            <a:xfrm>
+              <a:off x="5903129" y="2706239"/>
+              <a:ext cx="484830" cy="484830"/>
+            </a:xfrm>
+            <a:prstGeom prst="rect">
+              <a:avLst/>
+            </a:prstGeom>
+          </p:spPr>
+        </p:pic>
+      </p:grpSp>
+      <p:grpSp>
+        <p:nvGrpSpPr>
+          <p:cNvPr id="107" name="Grupo 106">
+            <a:extLst>
+              <a:ext uri="{FF2B5EF4-FFF2-40B4-BE49-F238E27FC236}">
+                <a16:creationId xmlns:a16="http://schemas.microsoft.com/office/drawing/2014/main" id="{B384FCF7-338F-48C8-8EBF-BC97FFC4BD46}"/>
+              </a:ext>
+            </a:extLst>
+          </p:cNvPr>
+          <p:cNvGrpSpPr/>
+          <p:nvPr/>
+        </p:nvGrpSpPr>
+        <p:grpSpPr>
+          <a:xfrm>
+            <a:off x="5115007" y="3815620"/>
+            <a:ext cx="1156815" cy="914400"/>
+            <a:chOff x="5115007" y="3815620"/>
+            <a:chExt cx="1156815" cy="914400"/>
+          </a:xfrm>
+        </p:grpSpPr>
+        <p:pic>
+          <p:nvPicPr>
+            <p:cNvPr id="80" name="Gráfico 79" descr="Medicina">
+              <a:extLst>
+                <a:ext uri="{FF2B5EF4-FFF2-40B4-BE49-F238E27FC236}">
+                  <a16:creationId xmlns:a16="http://schemas.microsoft.com/office/drawing/2014/main" id="{21020508-9598-4240-AF75-2C180725BE2E}"/>
+                </a:ext>
+              </a:extLst>
+            </p:cNvPr>
+            <p:cNvPicPr>
+              <a:picLocks noChangeAspect="1"/>
+            </p:cNvPicPr>
+            <p:nvPr/>
+          </p:nvPicPr>
+          <p:blipFill>
+            <a:blip r:embed="rId7">
+              <a:extLst>
+                <a:ext uri="{28A0092B-C50C-407E-A947-70E740481C1C}">
+                  <a14:useLocalDpi xmlns:a14="http://schemas.microsoft.com/office/drawing/2010/main" val="0"/>
+                </a:ext>
+                <a:ext uri="{96DAC541-7B7A-43D3-8B79-37D633B846F1}">
+                  <asvg:svgBlip xmlns:asvg="http://schemas.microsoft.com/office/drawing/2016/SVG/main" r:embed="rId8"/>
+                </a:ext>
+              </a:extLst>
+            </a:blip>
+            <a:stretch>
+              <a:fillRect/>
+            </a:stretch>
+          </p:blipFill>
+          <p:spPr>
+            <a:xfrm>
+              <a:off x="5115007" y="3815620"/>
+              <a:ext cx="914400" cy="914400"/>
+            </a:xfrm>
+            <a:prstGeom prst="rect">
+              <a:avLst/>
+            </a:prstGeom>
+          </p:spPr>
+        </p:pic>
+        <p:pic>
+          <p:nvPicPr>
+            <p:cNvPr id="96" name="Gráfico 95" descr="Reciclaje">
+              <a:extLst>
+                <a:ext uri="{FF2B5EF4-FFF2-40B4-BE49-F238E27FC236}">
+                  <a16:creationId xmlns:a16="http://schemas.microsoft.com/office/drawing/2014/main" id="{7E06E715-1606-4AF8-BD96-B4FE6852F3F7}"/>
+                </a:ext>
+              </a:extLst>
+            </p:cNvPr>
+            <p:cNvPicPr>
+              <a:picLocks noChangeAspect="1"/>
+            </p:cNvPicPr>
+            <p:nvPr/>
+          </p:nvPicPr>
+          <p:blipFill>
+            <a:blip r:embed="rId13">
+              <a:extLst>
+                <a:ext uri="{28A0092B-C50C-407E-A947-70E740481C1C}">
+                  <a14:useLocalDpi xmlns:a14="http://schemas.microsoft.com/office/drawing/2010/main" val="0"/>
+                </a:ext>
+                <a:ext uri="{96DAC541-7B7A-43D3-8B79-37D633B846F1}">
+                  <asvg:svgBlip xmlns:asvg="http://schemas.microsoft.com/office/drawing/2016/SVG/main" r:embed="rId14"/>
+                </a:ext>
+              </a:extLst>
+            </a:blip>
+            <a:stretch>
+              <a:fillRect/>
+            </a:stretch>
+          </p:blipFill>
+          <p:spPr>
+            <a:xfrm>
+              <a:off x="5786992" y="4213016"/>
+              <a:ext cx="484830" cy="484830"/>
+            </a:xfrm>
+            <a:prstGeom prst="rect">
+              <a:avLst/>
+            </a:prstGeom>
+          </p:spPr>
+        </p:pic>
+      </p:grpSp>
+      <p:grpSp>
+        <p:nvGrpSpPr>
+          <p:cNvPr id="110" name="Grupo 109">
+            <a:extLst>
+              <a:ext uri="{FF2B5EF4-FFF2-40B4-BE49-F238E27FC236}">
+                <a16:creationId xmlns:a16="http://schemas.microsoft.com/office/drawing/2014/main" id="{062D7731-3D10-4D38-96AE-B17137464B91}"/>
+              </a:ext>
+            </a:extLst>
+          </p:cNvPr>
+          <p:cNvGrpSpPr/>
+          <p:nvPr/>
+        </p:nvGrpSpPr>
+        <p:grpSpPr>
+          <a:xfrm>
+            <a:off x="5115007" y="5251389"/>
+            <a:ext cx="1178635" cy="914400"/>
+            <a:chOff x="5115007" y="5251389"/>
+            <a:chExt cx="1178635" cy="914400"/>
+          </a:xfrm>
+        </p:grpSpPr>
+        <p:pic>
+          <p:nvPicPr>
+            <p:cNvPr id="79" name="Gráfico 78" descr="Ciclismo">
+              <a:extLst>
+                <a:ext uri="{FF2B5EF4-FFF2-40B4-BE49-F238E27FC236}">
+                  <a16:creationId xmlns:a16="http://schemas.microsoft.com/office/drawing/2014/main" id="{29F88BF0-5352-4366-9CAD-5327E868086F}"/>
+                </a:ext>
+              </a:extLst>
+            </p:cNvPr>
+            <p:cNvPicPr>
+              <a:picLocks noChangeAspect="1"/>
+            </p:cNvPicPr>
+            <p:nvPr/>
+          </p:nvPicPr>
+          <p:blipFill>
+            <a:blip r:embed="rId9">
+              <a:extLst>
+                <a:ext uri="{28A0092B-C50C-407E-A947-70E740481C1C}">
+                  <a14:useLocalDpi xmlns:a14="http://schemas.microsoft.com/office/drawing/2010/main" val="0"/>
+                </a:ext>
+                <a:ext uri="{96DAC541-7B7A-43D3-8B79-37D633B846F1}">
+                  <asvg:svgBlip xmlns:asvg="http://schemas.microsoft.com/office/drawing/2016/SVG/main" r:embed="rId10"/>
+                </a:ext>
+              </a:extLst>
+            </a:blip>
+            <a:stretch>
+              <a:fillRect/>
+            </a:stretch>
+          </p:blipFill>
+          <p:spPr>
+            <a:xfrm>
+              <a:off x="5115007" y="5251389"/>
+              <a:ext cx="914400" cy="914400"/>
+            </a:xfrm>
+            <a:prstGeom prst="rect">
+              <a:avLst/>
+            </a:prstGeom>
+          </p:spPr>
+        </p:pic>
+        <p:pic>
+          <p:nvPicPr>
+            <p:cNvPr id="97" name="Gráfico 96" descr="Reciclaje">
+              <a:extLst>
+                <a:ext uri="{FF2B5EF4-FFF2-40B4-BE49-F238E27FC236}">
+                  <a16:creationId xmlns:a16="http://schemas.microsoft.com/office/drawing/2014/main" id="{15EB0A45-55F5-4779-BD7A-9D6AC036FE73}"/>
+                </a:ext>
+              </a:extLst>
+            </p:cNvPr>
+            <p:cNvPicPr>
+              <a:picLocks noChangeAspect="1"/>
+            </p:cNvPicPr>
+            <p:nvPr/>
+          </p:nvPicPr>
+          <p:blipFill>
+            <a:blip r:embed="rId13">
+              <a:extLst>
+                <a:ext uri="{28A0092B-C50C-407E-A947-70E740481C1C}">
+                  <a14:useLocalDpi xmlns:a14="http://schemas.microsoft.com/office/drawing/2010/main" val="0"/>
+                </a:ext>
+                <a:ext uri="{96DAC541-7B7A-43D3-8B79-37D633B846F1}">
+                  <asvg:svgBlip xmlns:asvg="http://schemas.microsoft.com/office/drawing/2016/SVG/main" r:embed="rId14"/>
+                </a:ext>
+              </a:extLst>
+            </a:blip>
+            <a:stretch>
+              <a:fillRect/>
+            </a:stretch>
+          </p:blipFill>
+          <p:spPr>
+            <a:xfrm>
+              <a:off x="5808812" y="5270713"/>
+              <a:ext cx="484830" cy="484830"/>
+            </a:xfrm>
+            <a:prstGeom prst="rect">
+              <a:avLst/>
+            </a:prstGeom>
+          </p:spPr>
+        </p:pic>
+      </p:grpSp>
+      <p:grpSp>
+        <p:nvGrpSpPr>
+          <p:cNvPr id="60" name="Grupo 59">
+            <a:extLst>
+              <a:ext uri="{FF2B5EF4-FFF2-40B4-BE49-F238E27FC236}">
+                <a16:creationId xmlns:a16="http://schemas.microsoft.com/office/drawing/2014/main" id="{ED5A2F6C-689A-456C-B6E6-975BBA4F86C3}"/>
+              </a:ext>
+            </a:extLst>
+          </p:cNvPr>
+          <p:cNvGrpSpPr/>
+          <p:nvPr/>
+        </p:nvGrpSpPr>
+        <p:grpSpPr>
+          <a:xfrm>
+            <a:off x="6820838" y="616042"/>
+            <a:ext cx="1670741" cy="1523553"/>
+            <a:chOff x="6820838" y="616042"/>
+            <a:chExt cx="1670741" cy="1523553"/>
+          </a:xfrm>
+        </p:grpSpPr>
+        <p:pic>
+          <p:nvPicPr>
+            <p:cNvPr id="86" name="Picture 2" descr="https://www.veris.com.ec/wp-content/themes/mdigital_veris/images/footer/deberes/atencion-digna.png">
+              <a:extLst>
+                <a:ext uri="{FF2B5EF4-FFF2-40B4-BE49-F238E27FC236}">
+                  <a16:creationId xmlns:a16="http://schemas.microsoft.com/office/drawing/2014/main" id="{50D153EA-B040-4B8B-8F38-47599D296DFE}"/>
+                </a:ext>
+              </a:extLst>
+            </p:cNvPr>
+            <p:cNvPicPr>
+              <a:picLocks noChangeAspect="1" noChangeArrowheads="1"/>
+            </p:cNvPicPr>
+            <p:nvPr/>
+          </p:nvPicPr>
+          <p:blipFill>
+            <a:blip r:embed="rId2">
+              <a:extLst>
+                <a:ext uri="{28A0092B-C50C-407E-A947-70E740481C1C}">
+                  <a14:useLocalDpi xmlns:a14="http://schemas.microsoft.com/office/drawing/2010/main" val="0"/>
+                </a:ext>
+              </a:extLst>
+            </a:blip>
+            <a:srcRect/>
+            <a:stretch>
+              <a:fillRect/>
+            </a:stretch>
+          </p:blipFill>
+          <p:spPr bwMode="auto">
+            <a:xfrm>
+              <a:off x="6820838" y="616042"/>
+              <a:ext cx="1582982" cy="1523553"/>
+            </a:xfrm>
+            <a:prstGeom prst="rect">
+              <a:avLst/>
+            </a:prstGeom>
+            <a:noFill/>
+            <a:extLst>
+              <a:ext uri="{909E8E84-426E-40DD-AFC4-6F175D3DCCD1}">
+                <a14:hiddenFill xmlns:a14="http://schemas.microsoft.com/office/drawing/2010/main">
+                  <a:solidFill>
+                    <a:srgbClr val="FFFFFF"/>
+                  </a:solidFill>
+                </a14:hiddenFill>
+              </a:ext>
+            </a:extLst>
+          </p:spPr>
+        </p:pic>
+        <p:pic>
+          <p:nvPicPr>
+            <p:cNvPr id="98" name="Gráfico 97" descr="Lupa">
+              <a:extLst>
+                <a:ext uri="{FF2B5EF4-FFF2-40B4-BE49-F238E27FC236}">
+                  <a16:creationId xmlns:a16="http://schemas.microsoft.com/office/drawing/2014/main" id="{61DDD192-2610-4806-B7AF-1BF93BAE8209}"/>
+                </a:ext>
+              </a:extLst>
+            </p:cNvPr>
+            <p:cNvPicPr>
+              <a:picLocks noChangeAspect="1"/>
+            </p:cNvPicPr>
+            <p:nvPr/>
+          </p:nvPicPr>
+          <p:blipFill>
+            <a:blip r:embed="rId15">
+              <a:extLst>
+                <a:ext uri="{28A0092B-C50C-407E-A947-70E740481C1C}">
+                  <a14:useLocalDpi xmlns:a14="http://schemas.microsoft.com/office/drawing/2010/main" val="0"/>
+                </a:ext>
+                <a:ext uri="{96DAC541-7B7A-43D3-8B79-37D633B846F1}">
+                  <asvg:svgBlip xmlns:asvg="http://schemas.microsoft.com/office/drawing/2016/SVG/main" r:embed="rId16"/>
+                </a:ext>
+              </a:extLst>
+            </a:blip>
+            <a:stretch>
+              <a:fillRect/>
+            </a:stretch>
+          </p:blipFill>
+          <p:spPr>
+            <a:xfrm>
+              <a:off x="8002671" y="1394872"/>
+              <a:ext cx="488908" cy="488908"/>
+            </a:xfrm>
+            <a:prstGeom prst="rect">
+              <a:avLst/>
+            </a:prstGeom>
+          </p:spPr>
+        </p:pic>
+      </p:grpSp>
+      <p:grpSp>
+        <p:nvGrpSpPr>
+          <p:cNvPr id="61" name="Grupo 60">
+            <a:extLst>
+              <a:ext uri="{FF2B5EF4-FFF2-40B4-BE49-F238E27FC236}">
+                <a16:creationId xmlns:a16="http://schemas.microsoft.com/office/drawing/2014/main" id="{8E408405-A2E8-4781-9CAF-9AF2EB807E52}"/>
+              </a:ext>
+            </a:extLst>
+          </p:cNvPr>
+          <p:cNvGrpSpPr/>
+          <p:nvPr/>
+        </p:nvGrpSpPr>
+        <p:grpSpPr>
+          <a:xfrm>
+            <a:off x="7155129" y="2400280"/>
+            <a:ext cx="1248691" cy="914400"/>
+            <a:chOff x="7155129" y="2400280"/>
+            <a:chExt cx="1248691" cy="914400"/>
+          </a:xfrm>
+        </p:grpSpPr>
+        <p:pic>
+          <p:nvPicPr>
+            <p:cNvPr id="85" name="Gráfico 84" descr="Usuarios">
+              <a:extLst>
+                <a:ext uri="{FF2B5EF4-FFF2-40B4-BE49-F238E27FC236}">
+                  <a16:creationId xmlns:a16="http://schemas.microsoft.com/office/drawing/2014/main" id="{AABF3438-0731-499B-995E-732E54239144}"/>
+                </a:ext>
+              </a:extLst>
+            </p:cNvPr>
+            <p:cNvPicPr>
+              <a:picLocks noChangeAspect="1"/>
+            </p:cNvPicPr>
+            <p:nvPr/>
+          </p:nvPicPr>
+          <p:blipFill>
+            <a:blip r:embed="rId5">
+              <a:extLst>
+                <a:ext uri="{28A0092B-C50C-407E-A947-70E740481C1C}">
+                  <a14:useLocalDpi xmlns:a14="http://schemas.microsoft.com/office/drawing/2010/main" val="0"/>
+                </a:ext>
+                <a:ext uri="{96DAC541-7B7A-43D3-8B79-37D633B846F1}">
+                  <asvg:svgBlip xmlns:asvg="http://schemas.microsoft.com/office/drawing/2016/SVG/main" r:embed="rId6"/>
+                </a:ext>
+              </a:extLst>
+            </a:blip>
+            <a:stretch>
+              <a:fillRect/>
+            </a:stretch>
+          </p:blipFill>
+          <p:spPr>
+            <a:xfrm>
+              <a:off x="7155129" y="2400280"/>
+              <a:ext cx="914400" cy="914400"/>
+            </a:xfrm>
+            <a:prstGeom prst="rect">
+              <a:avLst/>
+            </a:prstGeom>
+          </p:spPr>
+        </p:pic>
+        <p:pic>
+          <p:nvPicPr>
+            <p:cNvPr id="99" name="Gráfico 98" descr="Lupa">
+              <a:extLst>
+                <a:ext uri="{FF2B5EF4-FFF2-40B4-BE49-F238E27FC236}">
+                  <a16:creationId xmlns:a16="http://schemas.microsoft.com/office/drawing/2014/main" id="{02DB02D3-F7D0-4626-B9C1-C48D788A2A1D}"/>
+                </a:ext>
+              </a:extLst>
+            </p:cNvPr>
+            <p:cNvPicPr>
+              <a:picLocks noChangeAspect="1"/>
+            </p:cNvPicPr>
+            <p:nvPr/>
+          </p:nvPicPr>
+          <p:blipFill>
+            <a:blip r:embed="rId15">
+              <a:extLst>
+                <a:ext uri="{28A0092B-C50C-407E-A947-70E740481C1C}">
+                  <a14:useLocalDpi xmlns:a14="http://schemas.microsoft.com/office/drawing/2010/main" val="0"/>
+                </a:ext>
+                <a:ext uri="{96DAC541-7B7A-43D3-8B79-37D633B846F1}">
+                  <asvg:svgBlip xmlns:asvg="http://schemas.microsoft.com/office/drawing/2016/SVG/main" r:embed="rId16"/>
+                </a:ext>
+              </a:extLst>
+            </a:blip>
+            <a:stretch>
+              <a:fillRect/>
+            </a:stretch>
+          </p:blipFill>
+          <p:spPr>
+            <a:xfrm>
+              <a:off x="7914912" y="2613026"/>
+              <a:ext cx="488908" cy="488908"/>
+            </a:xfrm>
+            <a:prstGeom prst="rect">
+              <a:avLst/>
+            </a:prstGeom>
+          </p:spPr>
+        </p:pic>
+      </p:grpSp>
+      <p:grpSp>
+        <p:nvGrpSpPr>
+          <p:cNvPr id="108" name="Grupo 107">
+            <a:extLst>
+              <a:ext uri="{FF2B5EF4-FFF2-40B4-BE49-F238E27FC236}">
+                <a16:creationId xmlns:a16="http://schemas.microsoft.com/office/drawing/2014/main" id="{CDA151BD-59C5-403C-9BA3-668C846ABDF8}"/>
+              </a:ext>
+            </a:extLst>
+          </p:cNvPr>
+          <p:cNvGrpSpPr/>
+          <p:nvPr/>
+        </p:nvGrpSpPr>
+        <p:grpSpPr>
+          <a:xfrm>
+            <a:off x="7155129" y="3815620"/>
+            <a:ext cx="1169355" cy="914400"/>
+            <a:chOff x="7155129" y="3815620"/>
+            <a:chExt cx="1169355" cy="914400"/>
+          </a:xfrm>
+        </p:grpSpPr>
+        <p:pic>
+          <p:nvPicPr>
+            <p:cNvPr id="84" name="Gráfico 83" descr="Medicina">
+              <a:extLst>
+                <a:ext uri="{FF2B5EF4-FFF2-40B4-BE49-F238E27FC236}">
+                  <a16:creationId xmlns:a16="http://schemas.microsoft.com/office/drawing/2014/main" id="{4C6ADF6B-6E22-463E-B061-3EF83E6485EB}"/>
+                </a:ext>
+              </a:extLst>
+            </p:cNvPr>
+            <p:cNvPicPr>
+              <a:picLocks noChangeAspect="1"/>
+            </p:cNvPicPr>
+            <p:nvPr/>
+          </p:nvPicPr>
+          <p:blipFill>
+            <a:blip r:embed="rId7">
+              <a:extLst>
+                <a:ext uri="{28A0092B-C50C-407E-A947-70E740481C1C}">
+                  <a14:useLocalDpi xmlns:a14="http://schemas.microsoft.com/office/drawing/2010/main" val="0"/>
+                </a:ext>
+                <a:ext uri="{96DAC541-7B7A-43D3-8B79-37D633B846F1}">
+                  <asvg:svgBlip xmlns:asvg="http://schemas.microsoft.com/office/drawing/2016/SVG/main" r:embed="rId8"/>
+                </a:ext>
+              </a:extLst>
+            </a:blip>
+            <a:stretch>
+              <a:fillRect/>
+            </a:stretch>
+          </p:blipFill>
+          <p:spPr>
+            <a:xfrm>
+              <a:off x="7155129" y="3815620"/>
+              <a:ext cx="914400" cy="914400"/>
+            </a:xfrm>
+            <a:prstGeom prst="rect">
+              <a:avLst/>
+            </a:prstGeom>
+          </p:spPr>
+        </p:pic>
+        <p:pic>
+          <p:nvPicPr>
+            <p:cNvPr id="100" name="Gráfico 99" descr="Lupa">
+              <a:extLst>
+                <a:ext uri="{FF2B5EF4-FFF2-40B4-BE49-F238E27FC236}">
+                  <a16:creationId xmlns:a16="http://schemas.microsoft.com/office/drawing/2014/main" id="{94E6F02D-D653-4F73-8F99-6DD9CDC9C66C}"/>
+                </a:ext>
+              </a:extLst>
+            </p:cNvPr>
+            <p:cNvPicPr>
+              <a:picLocks noChangeAspect="1"/>
+            </p:cNvPicPr>
+            <p:nvPr/>
+          </p:nvPicPr>
+          <p:blipFill>
+            <a:blip r:embed="rId15">
+              <a:extLst>
+                <a:ext uri="{28A0092B-C50C-407E-A947-70E740481C1C}">
+                  <a14:useLocalDpi xmlns:a14="http://schemas.microsoft.com/office/drawing/2010/main" val="0"/>
+                </a:ext>
+                <a:ext uri="{96DAC541-7B7A-43D3-8B79-37D633B846F1}">
+                  <asvg:svgBlip xmlns:asvg="http://schemas.microsoft.com/office/drawing/2016/SVG/main" r:embed="rId16"/>
+                </a:ext>
+              </a:extLst>
+            </a:blip>
+            <a:stretch>
+              <a:fillRect/>
+            </a:stretch>
+          </p:blipFill>
+          <p:spPr>
+            <a:xfrm>
+              <a:off x="7835576" y="4151189"/>
+              <a:ext cx="488908" cy="488908"/>
+            </a:xfrm>
+            <a:prstGeom prst="rect">
+              <a:avLst/>
+            </a:prstGeom>
+          </p:spPr>
+        </p:pic>
+      </p:grpSp>
+      <p:grpSp>
+        <p:nvGrpSpPr>
+          <p:cNvPr id="109" name="Grupo 108">
+            <a:extLst>
+              <a:ext uri="{FF2B5EF4-FFF2-40B4-BE49-F238E27FC236}">
+                <a16:creationId xmlns:a16="http://schemas.microsoft.com/office/drawing/2014/main" id="{057B43E4-0DBC-47ED-8196-8631835F65BE}"/>
+              </a:ext>
+            </a:extLst>
+          </p:cNvPr>
+          <p:cNvGrpSpPr/>
+          <p:nvPr/>
+        </p:nvGrpSpPr>
+        <p:grpSpPr>
+          <a:xfrm>
+            <a:off x="7155129" y="5251389"/>
+            <a:ext cx="1248691" cy="914400"/>
+            <a:chOff x="7155129" y="5251389"/>
+            <a:chExt cx="1248691" cy="914400"/>
+          </a:xfrm>
+        </p:grpSpPr>
+        <p:pic>
+          <p:nvPicPr>
+            <p:cNvPr id="83" name="Gráfico 82" descr="Ciclismo">
+              <a:extLst>
+                <a:ext uri="{FF2B5EF4-FFF2-40B4-BE49-F238E27FC236}">
+                  <a16:creationId xmlns:a16="http://schemas.microsoft.com/office/drawing/2014/main" id="{6B5C7F2F-CB24-489C-85B5-582116E6B726}"/>
+                </a:ext>
+              </a:extLst>
+            </p:cNvPr>
+            <p:cNvPicPr>
+              <a:picLocks noChangeAspect="1"/>
+            </p:cNvPicPr>
+            <p:nvPr/>
+          </p:nvPicPr>
+          <p:blipFill>
+            <a:blip r:embed="rId9">
+              <a:extLst>
+                <a:ext uri="{28A0092B-C50C-407E-A947-70E740481C1C}">
+                  <a14:useLocalDpi xmlns:a14="http://schemas.microsoft.com/office/drawing/2010/main" val="0"/>
+                </a:ext>
+                <a:ext uri="{96DAC541-7B7A-43D3-8B79-37D633B846F1}">
+                  <asvg:svgBlip xmlns:asvg="http://schemas.microsoft.com/office/drawing/2016/SVG/main" r:embed="rId10"/>
+                </a:ext>
+              </a:extLst>
+            </a:blip>
+            <a:stretch>
+              <a:fillRect/>
+            </a:stretch>
+          </p:blipFill>
+          <p:spPr>
+            <a:xfrm>
+              <a:off x="7155129" y="5251389"/>
+              <a:ext cx="914400" cy="914400"/>
+            </a:xfrm>
+            <a:prstGeom prst="rect">
+              <a:avLst/>
+            </a:prstGeom>
+          </p:spPr>
+        </p:pic>
+        <p:pic>
+          <p:nvPicPr>
+            <p:cNvPr id="101" name="Gráfico 100" descr="Lupa">
+              <a:extLst>
+                <a:ext uri="{FF2B5EF4-FFF2-40B4-BE49-F238E27FC236}">
+                  <a16:creationId xmlns:a16="http://schemas.microsoft.com/office/drawing/2014/main" id="{A6E201AE-ABF1-47F1-A903-B5FBD1239004}"/>
+                </a:ext>
+              </a:extLst>
+            </p:cNvPr>
+            <p:cNvPicPr>
+              <a:picLocks noChangeAspect="1"/>
+            </p:cNvPicPr>
+            <p:nvPr/>
+          </p:nvPicPr>
+          <p:blipFill>
+            <a:blip r:embed="rId15">
+              <a:extLst>
+                <a:ext uri="{28A0092B-C50C-407E-A947-70E740481C1C}">
+                  <a14:useLocalDpi xmlns:a14="http://schemas.microsoft.com/office/drawing/2010/main" val="0"/>
+                </a:ext>
+                <a:ext uri="{96DAC541-7B7A-43D3-8B79-37D633B846F1}">
+                  <asvg:svgBlip xmlns:asvg="http://schemas.microsoft.com/office/drawing/2016/SVG/main" r:embed="rId16"/>
+                </a:ext>
+              </a:extLst>
+            </a:blip>
+            <a:stretch>
+              <a:fillRect/>
+            </a:stretch>
+          </p:blipFill>
+          <p:spPr>
+            <a:xfrm>
+              <a:off x="7914912" y="5534004"/>
+              <a:ext cx="488908" cy="488908"/>
+            </a:xfrm>
+            <a:prstGeom prst="rect">
+              <a:avLst/>
+            </a:prstGeom>
+          </p:spPr>
+        </p:pic>
+      </p:grpSp>
+    </p:spTree>
+    <p:extLst>
+      <p:ext uri="{BB962C8B-B14F-4D97-AF65-F5344CB8AC3E}">
+        <p14:creationId xmlns:p14="http://schemas.microsoft.com/office/powerpoint/2010/main" val="1200278099"/>
       </p:ext>
     </p:extLst>
   </p:cSld>

</xml_diff>